<commit_message>
Uploaded PPT and Report file.
</commit_message>
<xml_diff>
--- a/Insta clone.pptx
+++ b/Insta clone.pptx
@@ -11,11 +11,14 @@
     <p:sldId id="273" r:id="rId5"/>
     <p:sldId id="272" r:id="rId6"/>
     <p:sldId id="283" r:id="rId7"/>
-    <p:sldId id="275" r:id="rId8"/>
-    <p:sldId id="284" r:id="rId9"/>
-    <p:sldId id="285" r:id="rId10"/>
-    <p:sldId id="278" r:id="rId11"/>
-    <p:sldId id="279" r:id="rId12"/>
+    <p:sldId id="286" r:id="rId8"/>
+    <p:sldId id="275" r:id="rId9"/>
+    <p:sldId id="287" r:id="rId10"/>
+    <p:sldId id="284" r:id="rId11"/>
+    <p:sldId id="288" r:id="rId12"/>
+    <p:sldId id="285" r:id="rId13"/>
+    <p:sldId id="278" r:id="rId14"/>
+    <p:sldId id="279" r:id="rId15"/>
   </p:sldIdLst>
   <p:sldSz cx="9144000" cy="6858000" type="screen4x3"/>
   <p:notesSz cx="6858000" cy="9144000"/>
@@ -326,7 +329,7 @@
             <a:fld id="{1D5BB0C6-8FC1-47C0-B737-D54E21B5B868}" type="datetimeFigureOut">
               <a:rPr lang="en-US" smtClean="0"/>
               <a:pPr/>
-              <a:t>5/1/2024</a:t>
+              <a:t>5/20/2024</a:t>
             </a:fld>
             <a:endParaRPr lang="en-US"/>
           </a:p>
@@ -743,7 +746,7 @@
             <a:fld id="{1D5BB0C6-8FC1-47C0-B737-D54E21B5B868}" type="datetimeFigureOut">
               <a:rPr lang="en-US" smtClean="0"/>
               <a:pPr/>
-              <a:t>5/1/2024</a:t>
+              <a:t>5/20/2024</a:t>
             </a:fld>
             <a:endParaRPr lang="en-US"/>
           </a:p>
@@ -846,7 +849,7 @@
             <a:fld id="{1D5BB0C6-8FC1-47C0-B737-D54E21B5B868}" type="datetimeFigureOut">
               <a:rPr lang="en-US" smtClean="0"/>
               <a:pPr/>
-              <a:t>5/1/2024</a:t>
+              <a:t>5/20/2024</a:t>
             </a:fld>
             <a:endParaRPr lang="en-US"/>
           </a:p>
@@ -1083,7 +1086,7 @@
             <a:fld id="{1D5BB0C6-8FC1-47C0-B737-D54E21B5B868}" type="datetimeFigureOut">
               <a:rPr lang="en-US" smtClean="0"/>
               <a:pPr/>
-              <a:t>5/1/2024</a:t>
+              <a:t>5/20/2024</a:t>
             </a:fld>
             <a:endParaRPr lang="en-US"/>
           </a:p>
@@ -2210,6 +2213,778 @@
                 <a:latin typeface="Times New Roman" pitchFamily="18" charset="0"/>
                 <a:cs typeface="Times New Roman" pitchFamily="18" charset="0"/>
               </a:rPr>
+              <a:t>Project Highlights</a:t>
+            </a:r>
+            <a:r>
+              <a:rPr lang="en-US" dirty="0">
+                <a:latin typeface="Times New Roman" pitchFamily="18" charset="0"/>
+                <a:cs typeface="Times New Roman" pitchFamily="18" charset="0"/>
+              </a:rPr>
+              <a:t>(file upload)</a:t>
+            </a:r>
+          </a:p>
+        </p:txBody>
+      </p:sp>
+      <p:pic>
+        <p:nvPicPr>
+          <p:cNvPr id="4" name="Picture 3">
+            <a:extLst>
+              <a:ext uri="{FF2B5EF4-FFF2-40B4-BE49-F238E27FC236}">
+                <a16:creationId xmlns:a16="http://schemas.microsoft.com/office/drawing/2014/main" id="{37FEE16C-FE33-2437-7BA0-94393D5325D3}"/>
+              </a:ext>
+            </a:extLst>
+          </p:cNvPr>
+          <p:cNvPicPr>
+            <a:picLocks noChangeAspect="1"/>
+          </p:cNvPicPr>
+          <p:nvPr/>
+        </p:nvPicPr>
+        <p:blipFill>
+          <a:blip r:embed="rId2">
+            <a:extLst>
+              <a:ext uri="{28A0092B-C50C-407E-A947-70E740481C1C}">
+                <a14:useLocalDpi xmlns:a14="http://schemas.microsoft.com/office/drawing/2010/main" val="0"/>
+              </a:ext>
+            </a:extLst>
+          </a:blip>
+          <a:stretch>
+            <a:fillRect/>
+          </a:stretch>
+        </p:blipFill>
+        <p:spPr>
+          <a:xfrm>
+            <a:off x="440257" y="1628800"/>
+            <a:ext cx="7956376" cy="4274943"/>
+          </a:xfrm>
+          <a:prstGeom prst="rect">
+            <a:avLst/>
+          </a:prstGeom>
+        </p:spPr>
+      </p:pic>
+      <p:sp>
+        <p:nvSpPr>
+          <p:cNvPr id="5" name="TextBox 4">
+            <a:extLst>
+              <a:ext uri="{FF2B5EF4-FFF2-40B4-BE49-F238E27FC236}">
+                <a16:creationId xmlns:a16="http://schemas.microsoft.com/office/drawing/2014/main" id="{8592D5E6-B6E2-6542-7169-5073CFCAEBDB}"/>
+              </a:ext>
+            </a:extLst>
+          </p:cNvPr>
+          <p:cNvSpPr txBox="1"/>
+          <p:nvPr/>
+        </p:nvSpPr>
+        <p:spPr>
+          <a:xfrm>
+            <a:off x="3059832" y="1259468"/>
+            <a:ext cx="2520280" cy="646331"/>
+          </a:xfrm>
+          <a:prstGeom prst="rect">
+            <a:avLst/>
+          </a:prstGeom>
+          <a:noFill/>
+        </p:spPr>
+        <p:txBody>
+          <a:bodyPr wrap="square" rtlCol="0">
+            <a:spAutoFit/>
+          </a:bodyPr>
+          <a:lstStyle/>
+          <a:p>
+            <a:r>
+              <a:rPr lang="en-US" dirty="0"/>
+              <a:t>Browse button to locate the file</a:t>
+            </a:r>
+          </a:p>
+        </p:txBody>
+      </p:sp>
+      <p:sp>
+        <p:nvSpPr>
+          <p:cNvPr id="6" name="TextBox 5">
+            <a:extLst>
+              <a:ext uri="{FF2B5EF4-FFF2-40B4-BE49-F238E27FC236}">
+                <a16:creationId xmlns:a16="http://schemas.microsoft.com/office/drawing/2014/main" id="{19849034-7D55-CA2F-7084-AFF4E8A1411F}"/>
+              </a:ext>
+            </a:extLst>
+          </p:cNvPr>
+          <p:cNvSpPr txBox="1"/>
+          <p:nvPr/>
+        </p:nvSpPr>
+        <p:spPr>
+          <a:xfrm>
+            <a:off x="3491880" y="4859868"/>
+            <a:ext cx="2160240" cy="369332"/>
+          </a:xfrm>
+          <a:prstGeom prst="rect">
+            <a:avLst/>
+          </a:prstGeom>
+          <a:noFill/>
+        </p:spPr>
+        <p:txBody>
+          <a:bodyPr wrap="square" rtlCol="0">
+            <a:spAutoFit/>
+          </a:bodyPr>
+          <a:lstStyle/>
+          <a:p>
+            <a:r>
+              <a:rPr lang="en-US" dirty="0"/>
+              <a:t>Button to add post</a:t>
+            </a:r>
+          </a:p>
+        </p:txBody>
+      </p:sp>
+      <p:cxnSp>
+        <p:nvCxnSpPr>
+          <p:cNvPr id="8" name="Straight Arrow Connector 7">
+            <a:extLst>
+              <a:ext uri="{FF2B5EF4-FFF2-40B4-BE49-F238E27FC236}">
+                <a16:creationId xmlns:a16="http://schemas.microsoft.com/office/drawing/2014/main" id="{A1A20C46-04BA-7CE7-02C7-18B18DCD77D5}"/>
+              </a:ext>
+            </a:extLst>
+          </p:cNvPr>
+          <p:cNvCxnSpPr>
+            <a:cxnSpLocks/>
+          </p:cNvCxnSpPr>
+          <p:nvPr/>
+        </p:nvCxnSpPr>
+        <p:spPr>
+          <a:xfrm flipH="1">
+            <a:off x="3419872" y="1628800"/>
+            <a:ext cx="648072" cy="933323"/>
+          </a:xfrm>
+          <a:prstGeom prst="straightConnector1">
+            <a:avLst/>
+          </a:prstGeom>
+          <a:ln>
+            <a:tailEnd type="triangle"/>
+          </a:ln>
+        </p:spPr>
+        <p:style>
+          <a:lnRef idx="1">
+            <a:schemeClr val="accent1"/>
+          </a:lnRef>
+          <a:fillRef idx="0">
+            <a:schemeClr val="accent1"/>
+          </a:fillRef>
+          <a:effectRef idx="0">
+            <a:schemeClr val="accent1"/>
+          </a:effectRef>
+          <a:fontRef idx="minor">
+            <a:schemeClr val="tx1"/>
+          </a:fontRef>
+        </p:style>
+      </p:cxnSp>
+      <p:cxnSp>
+        <p:nvCxnSpPr>
+          <p:cNvPr id="13" name="Straight Arrow Connector 12">
+            <a:extLst>
+              <a:ext uri="{FF2B5EF4-FFF2-40B4-BE49-F238E27FC236}">
+                <a16:creationId xmlns:a16="http://schemas.microsoft.com/office/drawing/2014/main" id="{C87B0922-5486-A9D6-72F7-CDE5038C483B}"/>
+              </a:ext>
+            </a:extLst>
+          </p:cNvPr>
+          <p:cNvCxnSpPr>
+            <a:cxnSpLocks/>
+          </p:cNvCxnSpPr>
+          <p:nvPr/>
+        </p:nvCxnSpPr>
+        <p:spPr>
+          <a:xfrm>
+            <a:off x="4418445" y="3553776"/>
+            <a:ext cx="0" cy="1325012"/>
+          </a:xfrm>
+          <a:prstGeom prst="straightConnector1">
+            <a:avLst/>
+          </a:prstGeom>
+          <a:ln>
+            <a:tailEnd type="triangle"/>
+          </a:ln>
+        </p:spPr>
+        <p:style>
+          <a:lnRef idx="1">
+            <a:schemeClr val="accent1"/>
+          </a:lnRef>
+          <a:fillRef idx="0">
+            <a:schemeClr val="accent1"/>
+          </a:fillRef>
+          <a:effectRef idx="0">
+            <a:schemeClr val="accent1"/>
+          </a:effectRef>
+          <a:fontRef idx="minor">
+            <a:schemeClr val="tx1"/>
+          </a:fontRef>
+        </p:style>
+      </p:cxnSp>
+    </p:spTree>
+    <p:extLst>
+      <p:ext uri="{BB962C8B-B14F-4D97-AF65-F5344CB8AC3E}">
+        <p14:creationId xmlns:p14="http://schemas.microsoft.com/office/powerpoint/2010/main" val="2680909965"/>
+      </p:ext>
+    </p:extLst>
+  </p:cSld>
+  <p:clrMapOvr>
+    <a:masterClrMapping/>
+  </p:clrMapOvr>
+  <p:transition advTm="4000">
+    <p:cut/>
+  </p:transition>
+</p:sld>
+</file>
+
+<file path=ppt/slides/slide11.xml><?xml version="1.0" encoding="utf-8"?>
+<p:sld xmlns:a="http://schemas.openxmlformats.org/drawingml/2006/main" xmlns:r="http://schemas.openxmlformats.org/officeDocument/2006/relationships" xmlns:p="http://schemas.openxmlformats.org/presentationml/2006/main">
+  <p:cSld>
+    <p:spTree>
+      <p:nvGrpSpPr>
+        <p:cNvPr id="1" name=""/>
+        <p:cNvGrpSpPr/>
+        <p:nvPr/>
+      </p:nvGrpSpPr>
+      <p:grpSpPr>
+        <a:xfrm>
+          <a:off x="0" y="0"/>
+          <a:ext cx="0" cy="0"/>
+          <a:chOff x="0" y="0"/>
+          <a:chExt cx="0" cy="0"/>
+        </a:xfrm>
+      </p:grpSpPr>
+      <p:pic>
+        <p:nvPicPr>
+          <p:cNvPr id="23" name="Picture 22">
+            <a:extLst>
+              <a:ext uri="{FF2B5EF4-FFF2-40B4-BE49-F238E27FC236}">
+                <a16:creationId xmlns:a16="http://schemas.microsoft.com/office/drawing/2014/main" id="{8694E50F-0FCB-F4F6-5187-F9DA6E29BD0A}"/>
+              </a:ext>
+            </a:extLst>
+          </p:cNvPr>
+          <p:cNvPicPr>
+            <a:picLocks noChangeAspect="1"/>
+          </p:cNvPicPr>
+          <p:nvPr/>
+        </p:nvPicPr>
+        <p:blipFill>
+          <a:blip r:embed="rId2"/>
+          <a:stretch>
+            <a:fillRect/>
+          </a:stretch>
+        </p:blipFill>
+        <p:spPr>
+          <a:xfrm>
+            <a:off x="683568" y="1688089"/>
+            <a:ext cx="7776864" cy="3973159"/>
+          </a:xfrm>
+          <a:prstGeom prst="rect">
+            <a:avLst/>
+          </a:prstGeom>
+        </p:spPr>
+      </p:pic>
+      <p:sp>
+        <p:nvSpPr>
+          <p:cNvPr id="2" name="TextBox 1"/>
+          <p:cNvSpPr txBox="1"/>
+          <p:nvPr/>
+        </p:nvSpPr>
+        <p:spPr>
+          <a:xfrm>
+            <a:off x="467544" y="260648"/>
+            <a:ext cx="5400600" cy="584775"/>
+          </a:xfrm>
+          <a:prstGeom prst="rect">
+            <a:avLst/>
+          </a:prstGeom>
+          <a:noFill/>
+        </p:spPr>
+        <p:txBody>
+          <a:bodyPr wrap="square" rtlCol="0">
+            <a:spAutoFit/>
+          </a:bodyPr>
+          <a:lstStyle/>
+          <a:p>
+            <a:r>
+              <a:rPr lang="en-US" sz="3200" dirty="0">
+                <a:latin typeface="Times New Roman" pitchFamily="18" charset="0"/>
+                <a:cs typeface="Times New Roman" pitchFamily="18" charset="0"/>
+              </a:rPr>
+              <a:t>Project Highlights</a:t>
+            </a:r>
+            <a:r>
+              <a:rPr lang="en-US" dirty="0">
+                <a:latin typeface="Times New Roman" pitchFamily="18" charset="0"/>
+                <a:cs typeface="Times New Roman" pitchFamily="18" charset="0"/>
+              </a:rPr>
+              <a:t>(file upload)</a:t>
+            </a:r>
+          </a:p>
+        </p:txBody>
+      </p:sp>
+      <p:sp>
+        <p:nvSpPr>
+          <p:cNvPr id="5" name="TextBox 4">
+            <a:extLst>
+              <a:ext uri="{FF2B5EF4-FFF2-40B4-BE49-F238E27FC236}">
+                <a16:creationId xmlns:a16="http://schemas.microsoft.com/office/drawing/2014/main" id="{8592D5E6-B6E2-6542-7169-5073CFCAEBDB}"/>
+              </a:ext>
+            </a:extLst>
+          </p:cNvPr>
+          <p:cNvSpPr txBox="1"/>
+          <p:nvPr/>
+        </p:nvSpPr>
+        <p:spPr>
+          <a:xfrm>
+            <a:off x="6516216" y="5662989"/>
+            <a:ext cx="2520280" cy="646331"/>
+          </a:xfrm>
+          <a:prstGeom prst="rect">
+            <a:avLst/>
+          </a:prstGeom>
+          <a:noFill/>
+        </p:spPr>
+        <p:txBody>
+          <a:bodyPr wrap="square" rtlCol="0">
+            <a:spAutoFit/>
+          </a:bodyPr>
+          <a:lstStyle/>
+          <a:p>
+            <a:r>
+              <a:rPr lang="en-US" dirty="0"/>
+              <a:t>Username of the user who posted</a:t>
+            </a:r>
+          </a:p>
+        </p:txBody>
+      </p:sp>
+      <p:sp>
+        <p:nvSpPr>
+          <p:cNvPr id="6" name="TextBox 5">
+            <a:extLst>
+              <a:ext uri="{FF2B5EF4-FFF2-40B4-BE49-F238E27FC236}">
+                <a16:creationId xmlns:a16="http://schemas.microsoft.com/office/drawing/2014/main" id="{19849034-7D55-CA2F-7084-AFF4E8A1411F}"/>
+              </a:ext>
+            </a:extLst>
+          </p:cNvPr>
+          <p:cNvSpPr txBox="1"/>
+          <p:nvPr/>
+        </p:nvSpPr>
+        <p:spPr>
+          <a:xfrm>
+            <a:off x="2699792" y="5729918"/>
+            <a:ext cx="2520280" cy="369332"/>
+          </a:xfrm>
+          <a:prstGeom prst="rect">
+            <a:avLst/>
+          </a:prstGeom>
+          <a:noFill/>
+        </p:spPr>
+        <p:txBody>
+          <a:bodyPr wrap="square" rtlCol="0">
+            <a:spAutoFit/>
+          </a:bodyPr>
+          <a:lstStyle/>
+          <a:p>
+            <a:r>
+              <a:rPr lang="en-US" dirty="0"/>
+              <a:t>Caption set by the user</a:t>
+            </a:r>
+          </a:p>
+        </p:txBody>
+      </p:sp>
+      <p:cxnSp>
+        <p:nvCxnSpPr>
+          <p:cNvPr id="8" name="Straight Arrow Connector 7">
+            <a:extLst>
+              <a:ext uri="{FF2B5EF4-FFF2-40B4-BE49-F238E27FC236}">
+                <a16:creationId xmlns:a16="http://schemas.microsoft.com/office/drawing/2014/main" id="{A1A20C46-04BA-7CE7-02C7-18B18DCD77D5}"/>
+              </a:ext>
+            </a:extLst>
+          </p:cNvPr>
+          <p:cNvCxnSpPr>
+            <a:cxnSpLocks/>
+          </p:cNvCxnSpPr>
+          <p:nvPr/>
+        </p:nvCxnSpPr>
+        <p:spPr>
+          <a:xfrm flipV="1">
+            <a:off x="3779912" y="3284984"/>
+            <a:ext cx="1440160" cy="2444934"/>
+          </a:xfrm>
+          <a:prstGeom prst="straightConnector1">
+            <a:avLst/>
+          </a:prstGeom>
+          <a:ln>
+            <a:tailEnd type="triangle"/>
+          </a:ln>
+        </p:spPr>
+        <p:style>
+          <a:lnRef idx="1">
+            <a:schemeClr val="accent1"/>
+          </a:lnRef>
+          <a:fillRef idx="0">
+            <a:schemeClr val="accent1"/>
+          </a:fillRef>
+          <a:effectRef idx="0">
+            <a:schemeClr val="accent1"/>
+          </a:effectRef>
+          <a:fontRef idx="minor">
+            <a:schemeClr val="tx1"/>
+          </a:fontRef>
+        </p:style>
+      </p:cxnSp>
+      <p:cxnSp>
+        <p:nvCxnSpPr>
+          <p:cNvPr id="13" name="Straight Arrow Connector 12">
+            <a:extLst>
+              <a:ext uri="{FF2B5EF4-FFF2-40B4-BE49-F238E27FC236}">
+                <a16:creationId xmlns:a16="http://schemas.microsoft.com/office/drawing/2014/main" id="{C87B0922-5486-A9D6-72F7-CDE5038C483B}"/>
+              </a:ext>
+            </a:extLst>
+          </p:cNvPr>
+          <p:cNvCxnSpPr>
+            <a:cxnSpLocks/>
+          </p:cNvCxnSpPr>
+          <p:nvPr/>
+        </p:nvCxnSpPr>
+        <p:spPr>
+          <a:xfrm flipH="1" flipV="1">
+            <a:off x="6156176" y="4447876"/>
+            <a:ext cx="864096" cy="1282042"/>
+          </a:xfrm>
+          <a:prstGeom prst="straightConnector1">
+            <a:avLst/>
+          </a:prstGeom>
+          <a:ln>
+            <a:tailEnd type="triangle"/>
+          </a:ln>
+        </p:spPr>
+        <p:style>
+          <a:lnRef idx="1">
+            <a:schemeClr val="accent1"/>
+          </a:lnRef>
+          <a:fillRef idx="0">
+            <a:schemeClr val="accent1"/>
+          </a:fillRef>
+          <a:effectRef idx="0">
+            <a:schemeClr val="accent1"/>
+          </a:effectRef>
+          <a:fontRef idx="minor">
+            <a:schemeClr val="tx1"/>
+          </a:fontRef>
+        </p:style>
+      </p:cxnSp>
+    </p:spTree>
+    <p:extLst>
+      <p:ext uri="{BB962C8B-B14F-4D97-AF65-F5344CB8AC3E}">
+        <p14:creationId xmlns:p14="http://schemas.microsoft.com/office/powerpoint/2010/main" val="378705505"/>
+      </p:ext>
+    </p:extLst>
+  </p:cSld>
+  <p:clrMapOvr>
+    <a:masterClrMapping/>
+  </p:clrMapOvr>
+  <p:transition advTm="4000">
+    <p:cut/>
+  </p:transition>
+</p:sld>
+</file>
+
+<file path=ppt/slides/slide12.xml><?xml version="1.0" encoding="utf-8"?>
+<p:sld xmlns:a="http://schemas.openxmlformats.org/drawingml/2006/main" xmlns:r="http://schemas.openxmlformats.org/officeDocument/2006/relationships" xmlns:p="http://schemas.openxmlformats.org/presentationml/2006/main">
+  <p:cSld>
+    <p:spTree>
+      <p:nvGrpSpPr>
+        <p:cNvPr id="1" name=""/>
+        <p:cNvGrpSpPr/>
+        <p:nvPr/>
+      </p:nvGrpSpPr>
+      <p:grpSpPr>
+        <a:xfrm>
+          <a:off x="0" y="0"/>
+          <a:ext cx="0" cy="0"/>
+          <a:chOff x="0" y="0"/>
+          <a:chExt cx="0" cy="0"/>
+        </a:xfrm>
+      </p:grpSpPr>
+      <p:sp>
+        <p:nvSpPr>
+          <p:cNvPr id="2" name="TextBox 1"/>
+          <p:cNvSpPr txBox="1"/>
+          <p:nvPr/>
+        </p:nvSpPr>
+        <p:spPr>
+          <a:xfrm>
+            <a:off x="467544" y="260648"/>
+            <a:ext cx="5400600" cy="584775"/>
+          </a:xfrm>
+          <a:prstGeom prst="rect">
+            <a:avLst/>
+          </a:prstGeom>
+          <a:noFill/>
+        </p:spPr>
+        <p:txBody>
+          <a:bodyPr wrap="square" rtlCol="0">
+            <a:spAutoFit/>
+          </a:bodyPr>
+          <a:lstStyle/>
+          <a:p>
+            <a:r>
+              <a:rPr lang="en-US" sz="3200" dirty="0">
+                <a:latin typeface="Times New Roman" pitchFamily="18" charset="0"/>
+                <a:cs typeface="Times New Roman" pitchFamily="18" charset="0"/>
+              </a:rPr>
+              <a:t>Project Highlights</a:t>
+            </a:r>
+            <a:r>
+              <a:rPr lang="en-US" dirty="0">
+                <a:latin typeface="Times New Roman" pitchFamily="18" charset="0"/>
+                <a:cs typeface="Times New Roman" pitchFamily="18" charset="0"/>
+              </a:rPr>
+              <a:t>(Final Render)</a:t>
+            </a:r>
+          </a:p>
+        </p:txBody>
+      </p:sp>
+      <p:pic>
+        <p:nvPicPr>
+          <p:cNvPr id="4" name="Picture 3">
+            <a:extLst>
+              <a:ext uri="{FF2B5EF4-FFF2-40B4-BE49-F238E27FC236}">
+                <a16:creationId xmlns:a16="http://schemas.microsoft.com/office/drawing/2014/main" id="{A8C4D2A6-56C4-D2B1-96DF-B134B1148303}"/>
+              </a:ext>
+            </a:extLst>
+          </p:cNvPr>
+          <p:cNvPicPr>
+            <a:picLocks noChangeAspect="1"/>
+          </p:cNvPicPr>
+          <p:nvPr/>
+        </p:nvPicPr>
+        <p:blipFill>
+          <a:blip r:embed="rId2" cstate="print">
+            <a:extLst>
+              <a:ext uri="{28A0092B-C50C-407E-A947-70E740481C1C}">
+                <a14:useLocalDpi xmlns:a14="http://schemas.microsoft.com/office/drawing/2010/main" val="0"/>
+              </a:ext>
+            </a:extLst>
+          </a:blip>
+          <a:stretch>
+            <a:fillRect/>
+          </a:stretch>
+        </p:blipFill>
+        <p:spPr>
+          <a:xfrm>
+            <a:off x="899592" y="1502594"/>
+            <a:ext cx="7164288" cy="3852811"/>
+          </a:xfrm>
+          <a:prstGeom prst="rect">
+            <a:avLst/>
+          </a:prstGeom>
+        </p:spPr>
+      </p:pic>
+      <p:cxnSp>
+        <p:nvCxnSpPr>
+          <p:cNvPr id="6" name="Straight Arrow Connector 5">
+            <a:extLst>
+              <a:ext uri="{FF2B5EF4-FFF2-40B4-BE49-F238E27FC236}">
+                <a16:creationId xmlns:a16="http://schemas.microsoft.com/office/drawing/2014/main" id="{3DF15C31-9AB6-D98C-3FAB-79949FF1F8A1}"/>
+              </a:ext>
+            </a:extLst>
+          </p:cNvPr>
+          <p:cNvCxnSpPr/>
+          <p:nvPr/>
+        </p:nvCxnSpPr>
+        <p:spPr>
+          <a:xfrm flipV="1">
+            <a:off x="2483768" y="4797152"/>
+            <a:ext cx="1080120" cy="936104"/>
+          </a:xfrm>
+          <a:prstGeom prst="straightConnector1">
+            <a:avLst/>
+          </a:prstGeom>
+          <a:ln>
+            <a:tailEnd type="triangle"/>
+          </a:ln>
+        </p:spPr>
+        <p:style>
+          <a:lnRef idx="1">
+            <a:schemeClr val="accent1"/>
+          </a:lnRef>
+          <a:fillRef idx="0">
+            <a:schemeClr val="accent1"/>
+          </a:fillRef>
+          <a:effectRef idx="0">
+            <a:schemeClr val="accent1"/>
+          </a:effectRef>
+          <a:fontRef idx="minor">
+            <a:schemeClr val="tx1"/>
+          </a:fontRef>
+        </p:style>
+      </p:cxnSp>
+      <p:cxnSp>
+        <p:nvCxnSpPr>
+          <p:cNvPr id="7" name="Straight Arrow Connector 6">
+            <a:extLst>
+              <a:ext uri="{FF2B5EF4-FFF2-40B4-BE49-F238E27FC236}">
+                <a16:creationId xmlns:a16="http://schemas.microsoft.com/office/drawing/2014/main" id="{1EBCC166-674F-DC76-BA0E-38CB544BBDCA}"/>
+              </a:ext>
+            </a:extLst>
+          </p:cNvPr>
+          <p:cNvCxnSpPr>
+            <a:cxnSpLocks/>
+          </p:cNvCxnSpPr>
+          <p:nvPr/>
+        </p:nvCxnSpPr>
+        <p:spPr>
+          <a:xfrm flipH="1">
+            <a:off x="5580112" y="4437112"/>
+            <a:ext cx="1346328" cy="0"/>
+          </a:xfrm>
+          <a:prstGeom prst="straightConnector1">
+            <a:avLst/>
+          </a:prstGeom>
+          <a:ln>
+            <a:tailEnd type="triangle"/>
+          </a:ln>
+        </p:spPr>
+        <p:style>
+          <a:lnRef idx="1">
+            <a:schemeClr val="accent1"/>
+          </a:lnRef>
+          <a:fillRef idx="0">
+            <a:schemeClr val="accent1"/>
+          </a:fillRef>
+          <a:effectRef idx="0">
+            <a:schemeClr val="accent1"/>
+          </a:effectRef>
+          <a:fontRef idx="minor">
+            <a:schemeClr val="tx1"/>
+          </a:fontRef>
+        </p:style>
+      </p:cxnSp>
+      <p:sp>
+        <p:nvSpPr>
+          <p:cNvPr id="10" name="TextBox 9">
+            <a:extLst>
+              <a:ext uri="{FF2B5EF4-FFF2-40B4-BE49-F238E27FC236}">
+                <a16:creationId xmlns:a16="http://schemas.microsoft.com/office/drawing/2014/main" id="{606B1E61-D7E8-4EE4-2B21-31D00374C141}"/>
+              </a:ext>
+            </a:extLst>
+          </p:cNvPr>
+          <p:cNvSpPr txBox="1"/>
+          <p:nvPr/>
+        </p:nvSpPr>
+        <p:spPr>
+          <a:xfrm>
+            <a:off x="7164288" y="4251997"/>
+            <a:ext cx="1512168" cy="369332"/>
+          </a:xfrm>
+          <a:prstGeom prst="rect">
+            <a:avLst/>
+          </a:prstGeom>
+          <a:noFill/>
+        </p:spPr>
+        <p:txBody>
+          <a:bodyPr wrap="square" rtlCol="0">
+            <a:spAutoFit/>
+          </a:bodyPr>
+          <a:lstStyle/>
+          <a:p>
+            <a:r>
+              <a:rPr lang="en-US" dirty="0"/>
+              <a:t>Caption</a:t>
+            </a:r>
+          </a:p>
+        </p:txBody>
+      </p:sp>
+      <p:sp>
+        <p:nvSpPr>
+          <p:cNvPr id="11" name="TextBox 10">
+            <a:extLst>
+              <a:ext uri="{FF2B5EF4-FFF2-40B4-BE49-F238E27FC236}">
+                <a16:creationId xmlns:a16="http://schemas.microsoft.com/office/drawing/2014/main" id="{573A2A60-AA54-C19C-65CC-BF888CBE2741}"/>
+              </a:ext>
+            </a:extLst>
+          </p:cNvPr>
+          <p:cNvSpPr txBox="1"/>
+          <p:nvPr/>
+        </p:nvSpPr>
+        <p:spPr>
+          <a:xfrm>
+            <a:off x="1727684" y="5765461"/>
+            <a:ext cx="1512168" cy="369332"/>
+          </a:xfrm>
+          <a:prstGeom prst="rect">
+            <a:avLst/>
+          </a:prstGeom>
+          <a:noFill/>
+        </p:spPr>
+        <p:txBody>
+          <a:bodyPr wrap="square" rtlCol="0">
+            <a:spAutoFit/>
+          </a:bodyPr>
+          <a:lstStyle/>
+          <a:p>
+            <a:r>
+              <a:rPr lang="en-US" dirty="0"/>
+              <a:t>Comments</a:t>
+            </a:r>
+          </a:p>
+        </p:txBody>
+      </p:sp>
+    </p:spTree>
+    <p:extLst>
+      <p:ext uri="{BB962C8B-B14F-4D97-AF65-F5344CB8AC3E}">
+        <p14:creationId xmlns:p14="http://schemas.microsoft.com/office/powerpoint/2010/main" val="3720291796"/>
+      </p:ext>
+    </p:extLst>
+  </p:cSld>
+  <p:clrMapOvr>
+    <a:masterClrMapping/>
+  </p:clrMapOvr>
+  <p:transition advTm="4000">
+    <p:cut/>
+  </p:transition>
+</p:sld>
+</file>
+
+<file path=ppt/slides/slide13.xml><?xml version="1.0" encoding="utf-8"?>
+<p:sld xmlns:a="http://schemas.openxmlformats.org/drawingml/2006/main" xmlns:r="http://schemas.openxmlformats.org/officeDocument/2006/relationships" xmlns:p="http://schemas.openxmlformats.org/presentationml/2006/main">
+  <p:cSld>
+    <p:spTree>
+      <p:nvGrpSpPr>
+        <p:cNvPr id="1" name=""/>
+        <p:cNvGrpSpPr/>
+        <p:nvPr/>
+      </p:nvGrpSpPr>
+      <p:grpSpPr>
+        <a:xfrm>
+          <a:off x="0" y="0"/>
+          <a:ext cx="0" cy="0"/>
+          <a:chOff x="0" y="0"/>
+          <a:chExt cx="0" cy="0"/>
+        </a:xfrm>
+      </p:grpSpPr>
+      <p:sp>
+        <p:nvSpPr>
+          <p:cNvPr id="2" name="TextBox 1"/>
+          <p:cNvSpPr txBox="1"/>
+          <p:nvPr/>
+        </p:nvSpPr>
+        <p:spPr>
+          <a:xfrm>
+            <a:off x="467544" y="260648"/>
+            <a:ext cx="5400600" cy="584775"/>
+          </a:xfrm>
+          <a:prstGeom prst="rect">
+            <a:avLst/>
+          </a:prstGeom>
+          <a:noFill/>
+        </p:spPr>
+        <p:txBody>
+          <a:bodyPr wrap="square" rtlCol="0">
+            <a:spAutoFit/>
+          </a:bodyPr>
+          <a:lstStyle/>
+          <a:p>
+            <a:r>
+              <a:rPr lang="en-US" sz="3200" dirty="0">
+                <a:latin typeface="Times New Roman" pitchFamily="18" charset="0"/>
+                <a:cs typeface="Times New Roman" pitchFamily="18" charset="0"/>
+              </a:rPr>
               <a:t>Conclusion</a:t>
             </a:r>
           </a:p>
@@ -2350,7 +3125,7 @@
 </p:sld>
 </file>
 
-<file path=ppt/slides/slide11.xml><?xml version="1.0" encoding="utf-8"?>
+<file path=ppt/slides/slide14.xml><?xml version="1.0" encoding="utf-8"?>
 <p:sld xmlns:a="http://schemas.openxmlformats.org/drawingml/2006/main" xmlns:r="http://schemas.openxmlformats.org/officeDocument/2006/relationships" xmlns:p="http://schemas.openxmlformats.org/presentationml/2006/main">
   <p:cSld>
     <p:spTree>
@@ -2634,7 +3409,7 @@
         <p:spPr>
           <a:xfrm>
             <a:off x="323528" y="1196752"/>
-            <a:ext cx="6912768" cy="4128310"/>
+            <a:ext cx="6912768" cy="4820807"/>
           </a:xfrm>
           <a:prstGeom prst="rect">
             <a:avLst/>
@@ -2708,6 +3483,22 @@
                 <a:cs typeface="Times New Roman" pitchFamily="18" charset="0"/>
               </a:rPr>
               <a:t> Key Features </a:t>
+            </a:r>
+          </a:p>
+          <a:p>
+            <a:pPr>
+              <a:lnSpc>
+                <a:spcPct val="250000"/>
+              </a:lnSpc>
+              <a:buFont typeface="Arial" pitchFamily="34" charset="0"/>
+              <a:buChar char="•"/>
+            </a:pPr>
+            <a:r>
+              <a:rPr lang="en-US" dirty="0">
+                <a:latin typeface="Times New Roman" pitchFamily="18" charset="0"/>
+                <a:cs typeface="Times New Roman" pitchFamily="18" charset="0"/>
+              </a:rPr>
+              <a:t>Project Highlights</a:t>
             </a:r>
           </a:p>
           <a:p>
@@ -2795,7 +3586,7 @@
           <a:lstStyle/>
           <a:p>
             <a:r>
-              <a:rPr lang="en-US" sz="3200" b="1" dirty="0">
+              <a:rPr lang="en-US" sz="3200" dirty="0">
                 <a:latin typeface="Times New Roman" pitchFamily="18" charset="0"/>
                 <a:cs typeface="Times New Roman" pitchFamily="18" charset="0"/>
               </a:rPr>
@@ -2819,7 +3610,7 @@
         <p:spPr>
           <a:xfrm>
             <a:off x="683568" y="1204992"/>
-            <a:ext cx="7776864" cy="3885936"/>
+            <a:ext cx="7776864" cy="2951064"/>
           </a:xfrm>
           <a:prstGeom prst="rect">
             <a:avLst/>
@@ -2832,17 +3623,17 @@
           </a:bodyPr>
           <a:lstStyle/>
           <a:p>
-            <a:pPr>
-              <a:lnSpc>
-                <a:spcPct val="200000"/>
-              </a:lnSpc>
-            </a:pPr>
-            <a:r>
-              <a:rPr lang="en-US" dirty="0">
-                <a:latin typeface="Times New Roman" panose="02020603050405020304" pitchFamily="18" charset="0"/>
-                <a:cs typeface="Times New Roman" panose="02020603050405020304" pitchFamily="18" charset="0"/>
-              </a:rPr>
-              <a:t>In this project, we will be creating Instagram clone . The project aimed at replicating the core </a:t>
+            <a:pPr algn="just">
+              <a:lnSpc>
+                <a:spcPct val="150000"/>
+              </a:lnSpc>
+            </a:pPr>
+            <a:r>
+              <a:rPr lang="en-US" dirty="0">
+                <a:latin typeface="Times New Roman" panose="02020603050405020304" pitchFamily="18" charset="0"/>
+                <a:cs typeface="Times New Roman" panose="02020603050405020304" pitchFamily="18" charset="0"/>
+              </a:rPr>
+              <a:t>In this project, we will be creating Instagram clone. The project aimed at replicating the core </a:t>
             </a:r>
             <a:r>
               <a:rPr lang="en-IN" dirty="0">
@@ -2856,8 +3647,15 @@
                 <a:latin typeface="Times New Roman" panose="02020603050405020304" pitchFamily="18" charset="0"/>
                 <a:cs typeface="Times New Roman" panose="02020603050405020304" pitchFamily="18" charset="0"/>
               </a:rPr>
-              <a:t>. The  project is made by implementing React JS.</a:t>
-            </a:r>
+              <a:t>.</a:t>
+            </a:r>
+          </a:p>
+          <a:p>
+            <a:pPr algn="just">
+              <a:lnSpc>
+                <a:spcPct val="150000"/>
+              </a:lnSpc>
+            </a:pPr>
             <a:br>
               <a:rPr lang="en-US" dirty="0">
                 <a:latin typeface="Times New Roman" panose="02020603050405020304" pitchFamily="18" charset="0"/>
@@ -2987,7 +3785,7 @@
           </a:bodyPr>
           <a:lstStyle/>
           <a:p>
-            <a:pPr>
+            <a:pPr algn="just">
               <a:lnSpc>
                 <a:spcPct val="200000"/>
               </a:lnSpc>
@@ -3015,7 +3813,7 @@
             </a:r>
           </a:p>
           <a:p>
-            <a:pPr>
+            <a:pPr algn="just">
               <a:lnSpc>
                 <a:spcPct val="200000"/>
               </a:lnSpc>
@@ -3122,7 +3920,7 @@
           </a:bodyPr>
           <a:lstStyle/>
           <a:p>
-            <a:pPr>
+            <a:pPr algn="just">
               <a:lnSpc>
                 <a:spcPct val="150000"/>
               </a:lnSpc>
@@ -3166,7 +3964,7 @@
         <p:spPr>
           <a:xfrm>
             <a:off x="539552" y="1484784"/>
-            <a:ext cx="8064896" cy="2446824"/>
+            <a:ext cx="8064896" cy="3399457"/>
           </a:xfrm>
           <a:prstGeom prst="rect">
             <a:avLst/>
@@ -3179,7 +3977,7 @@
           </a:bodyPr>
           <a:lstStyle/>
           <a:p>
-            <a:pPr>
+            <a:pPr algn="just">
               <a:lnSpc>
                 <a:spcPct val="150000"/>
               </a:lnSpc>
@@ -3193,7 +3991,10 @@
             </a:r>
           </a:p>
           <a:p>
-            <a:pPr marL="285750" indent="-285750">
+            <a:pPr marL="285750" indent="-285750" algn="just">
+              <a:lnSpc>
+                <a:spcPct val="150000"/>
+              </a:lnSpc>
               <a:buFont typeface="Courier New" panose="02070309020205020404" pitchFamily="49" charset="0"/>
               <a:buChar char="o"/>
             </a:pPr>
@@ -3206,7 +4007,10 @@
             </a:r>
           </a:p>
           <a:p>
-            <a:pPr marL="285750" indent="-285750">
+            <a:pPr marL="285750" indent="-285750" algn="just">
+              <a:lnSpc>
+                <a:spcPct val="150000"/>
+              </a:lnSpc>
               <a:buFont typeface="Courier New" panose="02070309020205020404" pitchFamily="49" charset="0"/>
               <a:buChar char="o"/>
             </a:pPr>
@@ -3215,25 +4019,14 @@
                 <a:latin typeface="Times New Roman" pitchFamily="18" charset="0"/>
                 <a:cs typeface="Times New Roman" pitchFamily="18" charset="0"/>
               </a:rPr>
-              <a:t>&lt;</a:t>
-            </a:r>
-            <a:r>
-              <a:rPr lang="en-US" dirty="0" err="1">
-                <a:latin typeface="Times New Roman" pitchFamily="18" charset="0"/>
-                <a:cs typeface="Times New Roman" pitchFamily="18" charset="0"/>
-              </a:rPr>
-              <a:t>ul</a:t>
-            </a:r>
-            <a:r>
-              <a:rPr lang="en-US" dirty="0">
-                <a:latin typeface="Times New Roman" pitchFamily="18" charset="0"/>
-                <a:cs typeface="Times New Roman" pitchFamily="18" charset="0"/>
-              </a:rPr>
-              <a:t>&gt;</a:t>
-            </a:r>
-          </a:p>
-          <a:p>
-            <a:pPr marL="285750" indent="-285750">
+              <a:t>&lt;input&gt;</a:t>
+            </a:r>
+          </a:p>
+          <a:p>
+            <a:pPr marL="285750" indent="-285750" algn="just">
+              <a:lnSpc>
+                <a:spcPct val="150000"/>
+              </a:lnSpc>
               <a:buFont typeface="Courier New" panose="02070309020205020404" pitchFamily="49" charset="0"/>
               <a:buChar char="o"/>
             </a:pPr>
@@ -3242,11 +4035,14 @@
                 <a:latin typeface="Times New Roman" pitchFamily="18" charset="0"/>
                 <a:cs typeface="Times New Roman" pitchFamily="18" charset="0"/>
               </a:rPr>
-              <a:t>&lt; li &gt;</a:t>
-            </a:r>
-          </a:p>
-          <a:p>
-            <a:pPr marL="285750" indent="-285750">
+              <a:t>&lt;button&gt;</a:t>
+            </a:r>
+          </a:p>
+          <a:p>
+            <a:pPr marL="285750" indent="-285750" algn="just">
+              <a:lnSpc>
+                <a:spcPct val="150000"/>
+              </a:lnSpc>
               <a:buFont typeface="Courier New" panose="02070309020205020404" pitchFamily="49" charset="0"/>
               <a:buChar char="o"/>
             </a:pPr>
@@ -3255,24 +4051,14 @@
                 <a:latin typeface="Times New Roman" pitchFamily="18" charset="0"/>
                 <a:cs typeface="Times New Roman" pitchFamily="18" charset="0"/>
               </a:rPr>
-              <a:t>&lt;input&gt;</a:t>
-            </a:r>
-          </a:p>
-          <a:p>
-            <a:pPr marL="285750" indent="-285750">
-              <a:buFont typeface="Courier New" panose="02070309020205020404" pitchFamily="49" charset="0"/>
-              <a:buChar char="o"/>
-            </a:pPr>
-            <a:r>
-              <a:rPr lang="en-US" dirty="0">
-                <a:latin typeface="Times New Roman" pitchFamily="18" charset="0"/>
-                <a:cs typeface="Times New Roman" pitchFamily="18" charset="0"/>
-              </a:rPr>
-              <a:t>&lt;button&gt;</a:t>
-            </a:r>
-          </a:p>
-          <a:p>
-            <a:pPr marL="285750" indent="-285750">
+              <a:t>&lt;a&gt; </a:t>
+            </a:r>
+          </a:p>
+          <a:p>
+            <a:pPr marL="285750" indent="-285750" algn="just">
+              <a:lnSpc>
+                <a:spcPct val="150000"/>
+              </a:lnSpc>
               <a:buFont typeface="Courier New" panose="02070309020205020404" pitchFamily="49" charset="0"/>
               <a:buChar char="o"/>
             </a:pPr>
@@ -3282,7 +4068,10 @@
             </a:endParaRPr>
           </a:p>
           <a:p>
-            <a:pPr marL="285750" indent="-285750">
+            <a:pPr marL="285750" indent="-285750" algn="just">
+              <a:lnSpc>
+                <a:spcPct val="150000"/>
+              </a:lnSpc>
               <a:buFont typeface="Courier New" panose="02070309020205020404" pitchFamily="49" charset="0"/>
               <a:buChar char="o"/>
             </a:pPr>
@@ -3292,7 +4081,10 @@
             </a:endParaRPr>
           </a:p>
           <a:p>
-            <a:pPr marL="285750" indent="-285750">
+            <a:pPr marL="285750" indent="-285750" algn="just">
+              <a:lnSpc>
+                <a:spcPct val="150000"/>
+              </a:lnSpc>
               <a:buFont typeface="Courier New" panose="02070309020205020404" pitchFamily="49" charset="0"/>
               <a:buChar char="o"/>
             </a:pPr>
@@ -3302,20 +4094,23 @@
             </a:endParaRPr>
           </a:p>
           <a:p>
-            <a:pPr marL="285750" indent="-285750">
+            <a:pPr marL="285750" indent="-285750" algn="just">
+              <a:lnSpc>
+                <a:spcPct val="150000"/>
+              </a:lnSpc>
               <a:buFont typeface="Courier New" panose="02070309020205020404" pitchFamily="49" charset="0"/>
               <a:buChar char="o"/>
             </a:pPr>
-            <a:r>
-              <a:rPr lang="en-US" dirty="0">
-                <a:latin typeface="Times New Roman" pitchFamily="18" charset="0"/>
-                <a:cs typeface="Times New Roman" pitchFamily="18" charset="0"/>
-              </a:rPr>
-              <a:t>&lt;a&gt; </a:t>
-            </a:r>
-          </a:p>
-          <a:p>
-            <a:pPr marL="285750" indent="-285750">
+            <a:endParaRPr lang="en-US" dirty="0">
+              <a:latin typeface="Times New Roman" pitchFamily="18" charset="0"/>
+              <a:cs typeface="Times New Roman" pitchFamily="18" charset="0"/>
+            </a:endParaRPr>
+          </a:p>
+          <a:p>
+            <a:pPr marL="285750" indent="-285750" algn="just">
+              <a:lnSpc>
+                <a:spcPct val="150000"/>
+              </a:lnSpc>
               <a:buFont typeface="Courier New" panose="02070309020205020404" pitchFamily="49" charset="0"/>
               <a:buChar char="o"/>
             </a:pPr>
@@ -3342,7 +4137,10 @@
             </a:r>
           </a:p>
           <a:p>
-            <a:pPr marL="285750" indent="-285750">
+            <a:pPr marL="285750" indent="-285750" algn="just">
+              <a:lnSpc>
+                <a:spcPct val="150000"/>
+              </a:lnSpc>
               <a:buFont typeface="Courier New" panose="02070309020205020404" pitchFamily="49" charset="0"/>
               <a:buChar char="o"/>
             </a:pPr>
@@ -3355,7 +4153,10 @@
             </a:r>
           </a:p>
           <a:p>
-            <a:pPr marL="285750" indent="-285750">
+            <a:pPr marL="285750" indent="-285750" algn="just">
+              <a:lnSpc>
+                <a:spcPct val="150000"/>
+              </a:lnSpc>
               <a:buFont typeface="Courier New" panose="02070309020205020404" pitchFamily="49" charset="0"/>
               <a:buChar char="o"/>
             </a:pPr>
@@ -3382,7 +4183,10 @@
             </a:r>
           </a:p>
           <a:p>
-            <a:pPr marL="285750" indent="-285750">
+            <a:pPr marL="285750" indent="-285750" algn="just">
+              <a:lnSpc>
+                <a:spcPct val="150000"/>
+              </a:lnSpc>
               <a:buFont typeface="Courier New" panose="02070309020205020404" pitchFamily="49" charset="0"/>
               <a:buChar char="o"/>
             </a:pPr>
@@ -3393,11 +4197,6 @@
               </a:rPr>
               <a:t>&lt;p&gt;</a:t>
             </a:r>
-          </a:p>
-          <a:p>
-            <a:endParaRPr lang="en-US" dirty="0"/>
-          </a:p>
-          <a:p>
             <a:endParaRPr lang="en-US" dirty="0"/>
           </a:p>
         </p:txBody>
@@ -3416,8 +4215,8 @@
         </p:nvSpPr>
         <p:spPr>
           <a:xfrm>
-            <a:off x="539552" y="3726031"/>
-            <a:ext cx="7776864" cy="3970318"/>
+            <a:off x="539552" y="3645024"/>
+            <a:ext cx="7776864" cy="4197559"/>
           </a:xfrm>
           <a:prstGeom prst="rect">
             <a:avLst/>
@@ -3430,6 +4229,7 @@
           </a:bodyPr>
           <a:lstStyle/>
           <a:p>
+            <a:pPr algn="just"/>
             <a:r>
               <a:rPr lang="en-US" b="1" dirty="0">
                 <a:latin typeface="Times New Roman" panose="02020603050405020304" pitchFamily="18" charset="0"/>
@@ -3439,7 +4239,10 @@
             </a:r>
           </a:p>
           <a:p>
-            <a:pPr marL="285750" indent="-285750">
+            <a:pPr marL="285750" indent="-285750" algn="just">
+              <a:lnSpc>
+                <a:spcPct val="150000"/>
+              </a:lnSpc>
               <a:buFont typeface="Courier New" panose="02070309020205020404" pitchFamily="49" charset="0"/>
               <a:buChar char="o"/>
             </a:pPr>
@@ -3452,7 +4255,10 @@
             </a:r>
           </a:p>
           <a:p>
-            <a:pPr marL="285750" indent="-285750">
+            <a:pPr marL="285750" indent="-285750" algn="just">
+              <a:lnSpc>
+                <a:spcPct val="150000"/>
+              </a:lnSpc>
               <a:buFont typeface="Courier New" panose="02070309020205020404" pitchFamily="49" charset="0"/>
               <a:buChar char="o"/>
             </a:pPr>
@@ -3465,7 +4271,10 @@
             </a:r>
           </a:p>
           <a:p>
-            <a:pPr marL="285750" indent="-285750">
+            <a:pPr marL="285750" indent="-285750" algn="just">
+              <a:lnSpc>
+                <a:spcPct val="150000"/>
+              </a:lnSpc>
               <a:buFont typeface="Courier New" panose="02070309020205020404" pitchFamily="49" charset="0"/>
               <a:buChar char="o"/>
             </a:pPr>
@@ -3478,7 +4287,10 @@
             </a:r>
           </a:p>
           <a:p>
-            <a:pPr marL="285750" indent="-285750">
+            <a:pPr marL="285750" indent="-285750" algn="just">
+              <a:lnSpc>
+                <a:spcPct val="150000"/>
+              </a:lnSpc>
               <a:buFont typeface="Courier New" panose="02070309020205020404" pitchFamily="49" charset="0"/>
               <a:buChar char="o"/>
             </a:pPr>
@@ -3491,7 +4303,10 @@
             </a:r>
           </a:p>
           <a:p>
-            <a:pPr marL="285750" indent="-285750">
+            <a:pPr marL="285750" indent="-285750" algn="just">
+              <a:lnSpc>
+                <a:spcPct val="150000"/>
+              </a:lnSpc>
               <a:buFont typeface="Courier New" panose="02070309020205020404" pitchFamily="49" charset="0"/>
               <a:buChar char="o"/>
             </a:pPr>
@@ -3500,11 +4315,14 @@
                 <a:latin typeface="Times New Roman" panose="02020603050405020304" pitchFamily="18" charset="0"/>
                 <a:cs typeface="Times New Roman" panose="02020603050405020304" pitchFamily="18" charset="0"/>
               </a:rPr>
-              <a:t>left</a:t>
-            </a:r>
-          </a:p>
-          <a:p>
-            <a:pPr marL="285750" indent="-285750">
+              <a:t>color</a:t>
+            </a:r>
+          </a:p>
+          <a:p>
+            <a:pPr marL="285750" indent="-285750" algn="just">
+              <a:lnSpc>
+                <a:spcPct val="150000"/>
+              </a:lnSpc>
               <a:buFont typeface="Courier New" panose="02070309020205020404" pitchFamily="49" charset="0"/>
               <a:buChar char="o"/>
             </a:pPr>
@@ -3513,37 +4331,14 @@
                 <a:latin typeface="Times New Roman" panose="02020603050405020304" pitchFamily="18" charset="0"/>
                 <a:cs typeface="Times New Roman" panose="02020603050405020304" pitchFamily="18" charset="0"/>
               </a:rPr>
-              <a:t>top</a:t>
-            </a:r>
-          </a:p>
-          <a:p>
-            <a:pPr marL="285750" indent="-285750">
-              <a:buFont typeface="Courier New" panose="02070309020205020404" pitchFamily="49" charset="0"/>
-              <a:buChar char="o"/>
-            </a:pPr>
-            <a:r>
-              <a:rPr lang="en-US" dirty="0">
-                <a:latin typeface="Times New Roman" panose="02020603050405020304" pitchFamily="18" charset="0"/>
-                <a:cs typeface="Times New Roman" panose="02020603050405020304" pitchFamily="18" charset="0"/>
-              </a:rPr>
-              <a:t>color</a:t>
-            </a:r>
-          </a:p>
-          <a:p>
-            <a:pPr marL="285750" indent="-285750">
-              <a:buFont typeface="Courier New" panose="02070309020205020404" pitchFamily="49" charset="0"/>
-              <a:buChar char="o"/>
-            </a:pPr>
-            <a:r>
-              <a:rPr lang="en-US" dirty="0">
-                <a:latin typeface="Times New Roman" panose="02020603050405020304" pitchFamily="18" charset="0"/>
-                <a:cs typeface="Times New Roman" panose="02020603050405020304" pitchFamily="18" charset="0"/>
-              </a:rPr>
               <a:t>font-size</a:t>
             </a:r>
           </a:p>
           <a:p>
-            <a:pPr marL="285750" indent="-285750">
+            <a:pPr marL="285750" indent="-285750" algn="just">
+              <a:lnSpc>
+                <a:spcPct val="150000"/>
+              </a:lnSpc>
               <a:buFont typeface="Courier New" panose="02070309020205020404" pitchFamily="49" charset="0"/>
               <a:buChar char="o"/>
             </a:pPr>
@@ -3553,7 +4348,10 @@
             </a:endParaRPr>
           </a:p>
           <a:p>
-            <a:pPr marL="285750" indent="-285750">
+            <a:pPr marL="285750" indent="-285750" algn="just">
+              <a:lnSpc>
+                <a:spcPct val="150000"/>
+              </a:lnSpc>
               <a:buFont typeface="Courier New" panose="02070309020205020404" pitchFamily="49" charset="0"/>
               <a:buChar char="o"/>
             </a:pPr>
@@ -3563,9 +4361,10 @@
             </a:endParaRPr>
           </a:p>
           <a:p>
-            <a:pPr marL="285750" indent="-285750">
-              <a:buFont typeface="Courier New" panose="02070309020205020404" pitchFamily="49" charset="0"/>
-              <a:buChar char="o"/>
+            <a:pPr algn="just">
+              <a:lnSpc>
+                <a:spcPct val="150000"/>
+              </a:lnSpc>
             </a:pPr>
             <a:endParaRPr lang="en-US" dirty="0">
               <a:latin typeface="Times New Roman" panose="02020603050405020304" pitchFamily="18" charset="0"/>
@@ -3573,7 +4372,10 @@
             </a:endParaRPr>
           </a:p>
           <a:p>
-            <a:pPr marL="285750" indent="-285750">
+            <a:pPr marL="285750" indent="-285750" algn="just">
+              <a:lnSpc>
+                <a:spcPct val="150000"/>
+              </a:lnSpc>
               <a:buFont typeface="Courier New" panose="02070309020205020404" pitchFamily="49" charset="0"/>
               <a:buChar char="o"/>
             </a:pPr>
@@ -3583,27 +4385,42 @@
             </a:endParaRPr>
           </a:p>
           <a:p>
-            <a:pPr marL="285750" indent="-285750">
+            <a:pPr marL="285750" indent="-285750" algn="just">
+              <a:lnSpc>
+                <a:spcPct val="150000"/>
+              </a:lnSpc>
               <a:buFont typeface="Courier New" panose="02070309020205020404" pitchFamily="49" charset="0"/>
               <a:buChar char="o"/>
             </a:pPr>
-            <a:endParaRPr lang="en-US" dirty="0">
-              <a:latin typeface="Times New Roman" panose="02020603050405020304" pitchFamily="18" charset="0"/>
-              <a:cs typeface="Times New Roman" panose="02020603050405020304" pitchFamily="18" charset="0"/>
-            </a:endParaRPr>
-          </a:p>
-          <a:p>
-            <a:pPr marL="285750" indent="-285750">
+            <a:r>
+              <a:rPr lang="en-US" dirty="0">
+                <a:latin typeface="Times New Roman" panose="02020603050405020304" pitchFamily="18" charset="0"/>
+                <a:cs typeface="Times New Roman" panose="02020603050405020304" pitchFamily="18" charset="0"/>
+              </a:rPr>
+              <a:t>font-weight</a:t>
+            </a:r>
+          </a:p>
+          <a:p>
+            <a:pPr marL="285750" indent="-285750" algn="just">
+              <a:lnSpc>
+                <a:spcPct val="150000"/>
+              </a:lnSpc>
               <a:buFont typeface="Courier New" panose="02070309020205020404" pitchFamily="49" charset="0"/>
               <a:buChar char="o"/>
             </a:pPr>
-            <a:endParaRPr lang="en-US" dirty="0">
-              <a:latin typeface="Times New Roman" panose="02020603050405020304" pitchFamily="18" charset="0"/>
-              <a:cs typeface="Times New Roman" panose="02020603050405020304" pitchFamily="18" charset="0"/>
-            </a:endParaRPr>
-          </a:p>
-          <a:p>
-            <a:pPr marL="285750" indent="-285750">
+            <a:r>
+              <a:rPr lang="en-US" dirty="0">
+                <a:latin typeface="Times New Roman" panose="02020603050405020304" pitchFamily="18" charset="0"/>
+                <a:cs typeface="Times New Roman" panose="02020603050405020304" pitchFamily="18" charset="0"/>
+              </a:rPr>
+              <a:t>background-color</a:t>
+            </a:r>
+          </a:p>
+          <a:p>
+            <a:pPr marL="285750" indent="-285750" algn="just">
+              <a:lnSpc>
+                <a:spcPct val="150000"/>
+              </a:lnSpc>
               <a:buFont typeface="Courier New" panose="02070309020205020404" pitchFamily="49" charset="0"/>
               <a:buChar char="o"/>
             </a:pPr>
@@ -3612,11 +4429,14 @@
                 <a:latin typeface="Times New Roman" panose="02020603050405020304" pitchFamily="18" charset="0"/>
                 <a:cs typeface="Times New Roman" panose="02020603050405020304" pitchFamily="18" charset="0"/>
               </a:rPr>
-              <a:t>font-weight</a:t>
-            </a:r>
-          </a:p>
-          <a:p>
-            <a:pPr marL="285750" indent="-285750">
+              <a:t>display</a:t>
+            </a:r>
+          </a:p>
+          <a:p>
+            <a:pPr marL="285750" indent="-285750" algn="just">
+              <a:lnSpc>
+                <a:spcPct val="150000"/>
+              </a:lnSpc>
               <a:buFont typeface="Courier New" panose="02070309020205020404" pitchFamily="49" charset="0"/>
               <a:buChar char="o"/>
             </a:pPr>
@@ -3625,11 +4445,14 @@
                 <a:latin typeface="Times New Roman" panose="02020603050405020304" pitchFamily="18" charset="0"/>
                 <a:cs typeface="Times New Roman" panose="02020603050405020304" pitchFamily="18" charset="0"/>
               </a:rPr>
-              <a:t>display</a:t>
-            </a:r>
-          </a:p>
-          <a:p>
-            <a:pPr marL="285750" indent="-285750">
+              <a:t>width</a:t>
+            </a:r>
+          </a:p>
+          <a:p>
+            <a:pPr marL="285750" indent="-285750" algn="just">
+              <a:lnSpc>
+                <a:spcPct val="150000"/>
+              </a:lnSpc>
               <a:buFont typeface="Courier New" panose="02070309020205020404" pitchFamily="49" charset="0"/>
               <a:buChar char="o"/>
             </a:pPr>
@@ -3638,63 +4461,14 @@
                 <a:latin typeface="Times New Roman" panose="02020603050405020304" pitchFamily="18" charset="0"/>
                 <a:cs typeface="Times New Roman" panose="02020603050405020304" pitchFamily="18" charset="0"/>
               </a:rPr>
-              <a:t>cursor</a:t>
-            </a:r>
-          </a:p>
-          <a:p>
-            <a:pPr marL="285750" indent="-285750">
-              <a:buFont typeface="Courier New" panose="02070309020205020404" pitchFamily="49" charset="0"/>
-              <a:buChar char="o"/>
-            </a:pPr>
-            <a:r>
-              <a:rPr lang="en-US" dirty="0">
-                <a:latin typeface="Times New Roman" panose="02020603050405020304" pitchFamily="18" charset="0"/>
-                <a:cs typeface="Times New Roman" panose="02020603050405020304" pitchFamily="18" charset="0"/>
-              </a:rPr>
-              <a:t>background-color</a:t>
-            </a:r>
-          </a:p>
-          <a:p>
-            <a:pPr marL="285750" indent="-285750">
-              <a:buFont typeface="Courier New" panose="02070309020205020404" pitchFamily="49" charset="0"/>
-              <a:buChar char="o"/>
-            </a:pPr>
-            <a:r>
-              <a:rPr lang="en-US" dirty="0">
-                <a:latin typeface="Times New Roman" panose="02020603050405020304" pitchFamily="18" charset="0"/>
-                <a:cs typeface="Times New Roman" panose="02020603050405020304" pitchFamily="18" charset="0"/>
-              </a:rPr>
-              <a:t>display</a:t>
-            </a:r>
-          </a:p>
-          <a:p>
-            <a:pPr marL="285750" indent="-285750">
-              <a:buFont typeface="Courier New" panose="02070309020205020404" pitchFamily="49" charset="0"/>
-              <a:buChar char="o"/>
-            </a:pPr>
-            <a:r>
-              <a:rPr lang="en-US" dirty="0">
-                <a:latin typeface="Times New Roman" panose="02020603050405020304" pitchFamily="18" charset="0"/>
-                <a:cs typeface="Times New Roman" panose="02020603050405020304" pitchFamily="18" charset="0"/>
-              </a:rPr>
-              <a:t>width</a:t>
-            </a:r>
-          </a:p>
-          <a:p>
-            <a:pPr marL="285750" indent="-285750">
-              <a:buFont typeface="Courier New" panose="02070309020205020404" pitchFamily="49" charset="0"/>
-              <a:buChar char="o"/>
-            </a:pPr>
-            <a:r>
-              <a:rPr lang="en-US" dirty="0">
-                <a:latin typeface="Times New Roman" panose="02020603050405020304" pitchFamily="18" charset="0"/>
-                <a:cs typeface="Times New Roman" panose="02020603050405020304" pitchFamily="18" charset="0"/>
-              </a:rPr>
               <a:t>height</a:t>
             </a:r>
           </a:p>
           <a:p>
-            <a:pPr marL="285750" indent="-285750">
+            <a:pPr marL="285750" indent="-285750" algn="just">
+              <a:lnSpc>
+                <a:spcPct val="150000"/>
+              </a:lnSpc>
               <a:buFont typeface="Courier New" panose="02070309020205020404" pitchFamily="49" charset="0"/>
               <a:buChar char="o"/>
             </a:pPr>
@@ -3782,8 +4556,8 @@
         </p:nvSpPr>
         <p:spPr>
           <a:xfrm>
-            <a:off x="683568" y="952802"/>
-            <a:ext cx="7776864" cy="5355312"/>
+            <a:off x="683568" y="845423"/>
+            <a:ext cx="7776864" cy="5859553"/>
           </a:xfrm>
           <a:prstGeom prst="rect">
             <a:avLst/>
@@ -3796,6 +4570,11 @@
           </a:bodyPr>
           <a:lstStyle/>
           <a:p>
+            <a:pPr algn="just">
+              <a:lnSpc>
+                <a:spcPct val="150000"/>
+              </a:lnSpc>
+            </a:pPr>
             <a:r>
               <a:rPr lang="en-US" b="1" dirty="0">
                 <a:latin typeface="Times New Roman" panose="02020603050405020304" pitchFamily="18" charset="0"/>
@@ -3805,12 +4584,11 @@
             </a:r>
           </a:p>
           <a:p>
-            <a:endParaRPr lang="en-US" b="1" dirty="0">
-              <a:latin typeface="Times New Roman" panose="02020603050405020304" pitchFamily="18" charset="0"/>
-              <a:cs typeface="Times New Roman" panose="02020603050405020304" pitchFamily="18" charset="0"/>
-            </a:endParaRPr>
-          </a:p>
-          <a:p>
+            <a:pPr algn="just">
+              <a:lnSpc>
+                <a:spcPct val="150000"/>
+              </a:lnSpc>
+            </a:pPr>
             <a:r>
               <a:rPr lang="en-US" b="1" i="1" dirty="0">
                 <a:latin typeface="Times New Roman" panose="02020603050405020304" pitchFamily="18" charset="0"/>
@@ -3820,7 +4598,10 @@
             </a:r>
           </a:p>
           <a:p>
-            <a:pPr marL="285750" indent="-285750">
+            <a:pPr marL="285750" indent="-285750" algn="just">
+              <a:lnSpc>
+                <a:spcPct val="150000"/>
+              </a:lnSpc>
               <a:buFont typeface="Courier New" panose="02070309020205020404" pitchFamily="49" charset="0"/>
               <a:buChar char="o"/>
             </a:pPr>
@@ -3833,7 +4614,10 @@
             </a:r>
           </a:p>
           <a:p>
-            <a:pPr marL="285750" indent="-285750">
+            <a:pPr marL="285750" indent="-285750" algn="just">
+              <a:lnSpc>
+                <a:spcPct val="150000"/>
+              </a:lnSpc>
               <a:buFont typeface="Courier New" panose="02070309020205020404" pitchFamily="49" charset="0"/>
               <a:buChar char="o"/>
             </a:pPr>
@@ -3881,7 +4665,10 @@
             </a:r>
           </a:p>
           <a:p>
-            <a:pPr marL="285750" indent="-285750">
+            <a:pPr marL="285750" indent="-285750" algn="just">
+              <a:lnSpc>
+                <a:spcPct val="150000"/>
+              </a:lnSpc>
               <a:buFont typeface="Courier New" panose="02070309020205020404" pitchFamily="49" charset="0"/>
               <a:buChar char="o"/>
             </a:pPr>
@@ -3901,7 +4688,10 @@
             </a:r>
           </a:p>
           <a:p>
-            <a:pPr marL="285750" indent="-285750">
+            <a:pPr marL="285750" indent="-285750" algn="just">
+              <a:lnSpc>
+                <a:spcPct val="150000"/>
+              </a:lnSpc>
               <a:buFont typeface="Courier New" panose="02070309020205020404" pitchFamily="49" charset="0"/>
               <a:buChar char="o"/>
             </a:pPr>
@@ -3921,7 +4711,10 @@
             </a:r>
           </a:p>
           <a:p>
-            <a:pPr marL="285750" indent="-285750">
+            <a:pPr marL="285750" indent="-285750" algn="just">
+              <a:lnSpc>
+                <a:spcPct val="150000"/>
+              </a:lnSpc>
               <a:buFont typeface="Courier New" panose="02070309020205020404" pitchFamily="49" charset="0"/>
               <a:buChar char="o"/>
             </a:pPr>
@@ -3934,175 +4727,116 @@
             </a:r>
           </a:p>
           <a:p>
-            <a:pPr marL="285750" indent="-285750">
+            <a:pPr algn="just">
+              <a:lnSpc>
+                <a:spcPct val="150000"/>
+              </a:lnSpc>
+            </a:pPr>
+            <a:r>
+              <a:rPr lang="en-US" b="1" i="1" dirty="0">
+                <a:latin typeface="Times New Roman" panose="02020603050405020304" pitchFamily="18" charset="0"/>
+                <a:cs typeface="Times New Roman" panose="02020603050405020304" pitchFamily="18" charset="0"/>
+              </a:rPr>
+              <a:t>Modal Styles and Logic</a:t>
+            </a:r>
+            <a:r>
+              <a:rPr lang="en-US" dirty="0">
+                <a:latin typeface="Times New Roman" panose="02020603050405020304" pitchFamily="18" charset="0"/>
+                <a:cs typeface="Times New Roman" panose="02020603050405020304" pitchFamily="18" charset="0"/>
+              </a:rPr>
+              <a:t>:</a:t>
+            </a:r>
+          </a:p>
+          <a:p>
+            <a:pPr marL="285750" indent="-285750" algn="just">
+              <a:lnSpc>
+                <a:spcPct val="150000"/>
+              </a:lnSpc>
               <a:buFont typeface="Courier New" panose="02070309020205020404" pitchFamily="49" charset="0"/>
               <a:buChar char="o"/>
             </a:pPr>
             <a:r>
-              <a:rPr lang="en-US" dirty="0">
-                <a:latin typeface="Times New Roman" panose="02020603050405020304" pitchFamily="18" charset="0"/>
-                <a:cs typeface="Times New Roman" panose="02020603050405020304" pitchFamily="18" charset="0"/>
-              </a:rPr>
-              <a:t>Posts and </a:t>
-            </a:r>
-            <a:r>
               <a:rPr lang="en-US" dirty="0" err="1">
                 <a:latin typeface="Times New Roman" panose="02020603050405020304" pitchFamily="18" charset="0"/>
                 <a:cs typeface="Times New Roman" panose="02020603050405020304" pitchFamily="18" charset="0"/>
               </a:rPr>
-              <a:t>AddPost</a:t>
-            </a:r>
-            <a:r>
-              <a:rPr lang="en-US" dirty="0">
-                <a:latin typeface="Times New Roman" panose="02020603050405020304" pitchFamily="18" charset="0"/>
-                <a:cs typeface="Times New Roman" panose="02020603050405020304" pitchFamily="18" charset="0"/>
-              </a:rPr>
-              <a:t> components likely for displaying and creating posts.</a:t>
-            </a:r>
-          </a:p>
-          <a:p>
-            <a:pPr marL="285750" indent="-285750">
+              <a:t>getModalStyle</a:t>
+            </a:r>
+            <a:r>
+              <a:rPr lang="en-US" dirty="0">
+                <a:latin typeface="Times New Roman" panose="02020603050405020304" pitchFamily="18" charset="0"/>
+                <a:cs typeface="Times New Roman" panose="02020603050405020304" pitchFamily="18" charset="0"/>
+              </a:rPr>
+              <a:t> function defines the positioning for the modal on the screen.</a:t>
+            </a:r>
+          </a:p>
+          <a:p>
+            <a:pPr marL="285750" indent="-285750" algn="just">
+              <a:lnSpc>
+                <a:spcPct val="150000"/>
+              </a:lnSpc>
               <a:buFont typeface="Courier New" panose="02070309020205020404" pitchFamily="49" charset="0"/>
               <a:buChar char="o"/>
             </a:pPr>
             <a:r>
-              <a:rPr lang="en-US" dirty="0">
-                <a:latin typeface="Times New Roman" panose="02020603050405020304" pitchFamily="18" charset="0"/>
-                <a:cs typeface="Times New Roman" panose="02020603050405020304" pitchFamily="18" charset="0"/>
-              </a:rPr>
-              <a:t>Edit icon (Edit) from Material-UI, possibly for future editing functionality.</a:t>
-            </a:r>
-          </a:p>
-          <a:p>
+              <a:rPr lang="en-US" i="1" dirty="0" err="1">
+                <a:latin typeface="Times New Roman" panose="02020603050405020304" pitchFamily="18" charset="0"/>
+                <a:cs typeface="Times New Roman" panose="02020603050405020304" pitchFamily="18" charset="0"/>
+              </a:rPr>
+              <a:t>useStyles</a:t>
+            </a:r>
+            <a:r>
+              <a:rPr lang="en-US" dirty="0">
+                <a:latin typeface="Times New Roman" panose="02020603050405020304" pitchFamily="18" charset="0"/>
+                <a:cs typeface="Times New Roman" panose="02020603050405020304" pitchFamily="18" charset="0"/>
+              </a:rPr>
+              <a:t> hook creates CSS classes for the modal container.</a:t>
+            </a:r>
+          </a:p>
+          <a:p>
+            <a:pPr algn="just">
+              <a:lnSpc>
+                <a:spcPct val="150000"/>
+              </a:lnSpc>
+            </a:pPr>
             <a:r>
               <a:rPr lang="en-US" b="1" i="1" dirty="0">
                 <a:latin typeface="Times New Roman" panose="02020603050405020304" pitchFamily="18" charset="0"/>
                 <a:cs typeface="Times New Roman" panose="02020603050405020304" pitchFamily="18" charset="0"/>
               </a:rPr>
-              <a:t>Modal Styles and Logic</a:t>
-            </a:r>
-            <a:r>
-              <a:rPr lang="en-US" dirty="0">
-                <a:latin typeface="Times New Roman" panose="02020603050405020304" pitchFamily="18" charset="0"/>
-                <a:cs typeface="Times New Roman" panose="02020603050405020304" pitchFamily="18" charset="0"/>
-              </a:rPr>
-              <a:t>:</a:t>
-            </a:r>
-          </a:p>
-          <a:p>
-            <a:pPr marL="285750" indent="-285750">
+              <a:t>Conditional Rendering:</a:t>
+            </a:r>
+          </a:p>
+          <a:p>
+            <a:pPr marL="285750" indent="-285750" algn="just">
+              <a:lnSpc>
+                <a:spcPct val="150000"/>
+              </a:lnSpc>
               <a:buFont typeface="Courier New" panose="02070309020205020404" pitchFamily="49" charset="0"/>
               <a:buChar char="o"/>
             </a:pPr>
             <a:r>
-              <a:rPr lang="en-US" dirty="0" err="1">
-                <a:latin typeface="Times New Roman" panose="02020603050405020304" pitchFamily="18" charset="0"/>
-                <a:cs typeface="Times New Roman" panose="02020603050405020304" pitchFamily="18" charset="0"/>
-              </a:rPr>
-              <a:t>getModalStyle</a:t>
-            </a:r>
-            <a:r>
-              <a:rPr lang="en-US" dirty="0">
-                <a:latin typeface="Times New Roman" panose="02020603050405020304" pitchFamily="18" charset="0"/>
-                <a:cs typeface="Times New Roman" panose="02020603050405020304" pitchFamily="18" charset="0"/>
-              </a:rPr>
-              <a:t> function defines the positioning for the modal on the screen.</a:t>
-            </a:r>
-          </a:p>
-          <a:p>
-            <a:pPr marL="285750" indent="-285750">
+              <a:rPr lang="en-US" dirty="0">
+                <a:latin typeface="Times New Roman" panose="02020603050405020304" pitchFamily="18" charset="0"/>
+                <a:cs typeface="Times New Roman" panose="02020603050405020304" pitchFamily="18" charset="0"/>
+              </a:rPr>
+              <a:t>The UI content changes based on the logged-in state (user).</a:t>
+            </a:r>
+          </a:p>
+          <a:p>
+            <a:pPr marL="285750" indent="-285750" algn="just">
+              <a:lnSpc>
+                <a:spcPct val="150000"/>
+              </a:lnSpc>
               <a:buFont typeface="Courier New" panose="02070309020205020404" pitchFamily="49" charset="0"/>
               <a:buChar char="o"/>
             </a:pPr>
             <a:r>
-              <a:rPr lang="en-US" i="1" dirty="0" err="1">
-                <a:latin typeface="Times New Roman" panose="02020603050405020304" pitchFamily="18" charset="0"/>
-                <a:cs typeface="Times New Roman" panose="02020603050405020304" pitchFamily="18" charset="0"/>
-              </a:rPr>
-              <a:t>useStyles</a:t>
-            </a:r>
-            <a:r>
-              <a:rPr lang="en-US" dirty="0">
-                <a:latin typeface="Times New Roman" panose="02020603050405020304" pitchFamily="18" charset="0"/>
-                <a:cs typeface="Times New Roman" panose="02020603050405020304" pitchFamily="18" charset="0"/>
-              </a:rPr>
-              <a:t> hook creates CSS classes for the modal container.</a:t>
-            </a:r>
-          </a:p>
-          <a:p>
-            <a:r>
-              <a:rPr lang="en-US" b="1" i="1" dirty="0">
-                <a:latin typeface="Times New Roman" panose="02020603050405020304" pitchFamily="18" charset="0"/>
-                <a:cs typeface="Times New Roman" panose="02020603050405020304" pitchFamily="18" charset="0"/>
-              </a:rPr>
-              <a:t>Conditional Rendering:</a:t>
-            </a:r>
-          </a:p>
-          <a:p>
-            <a:pPr marL="285750" indent="-285750">
-              <a:buFont typeface="Courier New" panose="02070309020205020404" pitchFamily="49" charset="0"/>
-              <a:buChar char="o"/>
-            </a:pPr>
-            <a:r>
-              <a:rPr lang="en-US" dirty="0">
-                <a:latin typeface="Times New Roman" panose="02020603050405020304" pitchFamily="18" charset="0"/>
-                <a:cs typeface="Times New Roman" panose="02020603050405020304" pitchFamily="18" charset="0"/>
-              </a:rPr>
-              <a:t>The UI content changes based on the logged-in state (user).</a:t>
-            </a:r>
-          </a:p>
-          <a:p>
-            <a:pPr marL="285750" indent="-285750">
-              <a:buFont typeface="Courier New" panose="02070309020205020404" pitchFamily="49" charset="0"/>
-              <a:buChar char="o"/>
-            </a:pPr>
-            <a:r>
-              <a:rPr lang="en-US" dirty="0">
-                <a:latin typeface="Times New Roman" panose="02020603050405020304" pitchFamily="18" charset="0"/>
-                <a:cs typeface="Times New Roman" panose="02020603050405020304" pitchFamily="18" charset="0"/>
-              </a:rPr>
-              <a:t>Logged-in users see a logout button and an </a:t>
-            </a:r>
-            <a:r>
-              <a:rPr lang="en-US" dirty="0" err="1">
-                <a:latin typeface="Times New Roman" panose="02020603050405020304" pitchFamily="18" charset="0"/>
-                <a:cs typeface="Times New Roman" panose="02020603050405020304" pitchFamily="18" charset="0"/>
-              </a:rPr>
-              <a:t>AddPost</a:t>
-            </a:r>
-            <a:r>
-              <a:rPr lang="en-US" dirty="0">
-                <a:latin typeface="Times New Roman" panose="02020603050405020304" pitchFamily="18" charset="0"/>
-                <a:cs typeface="Times New Roman" panose="02020603050405020304" pitchFamily="18" charset="0"/>
-              </a:rPr>
-              <a:t> component.</a:t>
-            </a:r>
-          </a:p>
-          <a:p>
-            <a:pPr marL="285750" indent="-285750">
-              <a:buFont typeface="Courier New" panose="02070309020205020404" pitchFamily="49" charset="0"/>
-              <a:buChar char="o"/>
-            </a:pPr>
-            <a:r>
-              <a:rPr lang="en-US" dirty="0">
-                <a:latin typeface="Times New Roman" panose="02020603050405020304" pitchFamily="18" charset="0"/>
-                <a:cs typeface="Times New Roman" panose="02020603050405020304" pitchFamily="18" charset="0"/>
-              </a:rPr>
-              <a:t>Non-logged-in users see buttons for signup and </a:t>
-            </a:r>
-            <a:r>
-              <a:rPr lang="en-US" dirty="0" err="1">
-                <a:latin typeface="Times New Roman" panose="02020603050405020304" pitchFamily="18" charset="0"/>
-                <a:cs typeface="Times New Roman" panose="02020603050405020304" pitchFamily="18" charset="0"/>
-              </a:rPr>
-              <a:t>signin</a:t>
-            </a:r>
-            <a:r>
-              <a:rPr lang="en-US" dirty="0">
-                <a:latin typeface="Times New Roman" panose="02020603050405020304" pitchFamily="18" charset="0"/>
-                <a:cs typeface="Times New Roman" panose="02020603050405020304" pitchFamily="18" charset="0"/>
-              </a:rPr>
-              <a:t>, along with a message prompting them to login/register to create posts.</a:t>
+              <a:rPr lang="en-US" dirty="0">
+                <a:latin typeface="Times New Roman" panose="02020603050405020304" pitchFamily="18" charset="0"/>
+                <a:cs typeface="Times New Roman" panose="02020603050405020304" pitchFamily="18" charset="0"/>
+              </a:rPr>
+              <a:t>Logged-in users see a logout button.</a:t>
             </a:r>
           </a:p>
         </p:txBody>
@@ -4167,152 +4901,17 @@
                 <a:latin typeface="Times New Roman" pitchFamily="18" charset="0"/>
                 <a:cs typeface="Times New Roman" pitchFamily="18" charset="0"/>
               </a:rPr>
-              <a:t>Project Highlights</a:t>
-            </a:r>
-            <a:r>
-              <a:rPr lang="en-US" dirty="0">
-                <a:latin typeface="Times New Roman" pitchFamily="18" charset="0"/>
-                <a:cs typeface="Times New Roman" pitchFamily="18" charset="0"/>
-              </a:rPr>
-              <a:t>(Login/</a:t>
-            </a:r>
-            <a:r>
-              <a:rPr lang="en-US" dirty="0" err="1">
-                <a:latin typeface="Times New Roman" pitchFamily="18" charset="0"/>
-                <a:cs typeface="Times New Roman" pitchFamily="18" charset="0"/>
-              </a:rPr>
-              <a:t>SignUp</a:t>
-            </a:r>
-            <a:r>
-              <a:rPr lang="en-US" dirty="0">
-                <a:latin typeface="Times New Roman" pitchFamily="18" charset="0"/>
-                <a:cs typeface="Times New Roman" pitchFamily="18" charset="0"/>
-              </a:rPr>
-              <a:t> Page)</a:t>
+              <a:t>Key Features</a:t>
             </a:r>
           </a:p>
         </p:txBody>
       </p:sp>
-      <p:pic>
-        <p:nvPicPr>
-          <p:cNvPr id="5" name="Picture 4">
+      <p:sp>
+        <p:nvSpPr>
+          <p:cNvPr id="3" name="TextBox 2">
             <a:extLst>
               <a:ext uri="{FF2B5EF4-FFF2-40B4-BE49-F238E27FC236}">
-                <a16:creationId xmlns:a16="http://schemas.microsoft.com/office/drawing/2014/main" id="{182BFCC4-A93B-E6B8-D308-CB199ADC952F}"/>
-              </a:ext>
-            </a:extLst>
-          </p:cNvPr>
-          <p:cNvPicPr>
-            <a:picLocks noChangeAspect="1"/>
-          </p:cNvPicPr>
-          <p:nvPr/>
-        </p:nvPicPr>
-        <p:blipFill>
-          <a:blip r:embed="rId2" cstate="print">
-            <a:extLst>
-              <a:ext uri="{28A0092B-C50C-407E-A947-70E740481C1C}">
-                <a14:useLocalDpi xmlns:a14="http://schemas.microsoft.com/office/drawing/2010/main" val="0"/>
-              </a:ext>
-            </a:extLst>
-          </a:blip>
-          <a:stretch>
-            <a:fillRect/>
-          </a:stretch>
-        </p:blipFill>
-        <p:spPr>
-          <a:xfrm>
-            <a:off x="899592" y="1628800"/>
-            <a:ext cx="7164288" cy="3860278"/>
-          </a:xfrm>
-          <a:prstGeom prst="rect">
-            <a:avLst/>
-          </a:prstGeom>
-        </p:spPr>
-      </p:pic>
-      <p:cxnSp>
-        <p:nvCxnSpPr>
-          <p:cNvPr id="13" name="Straight Arrow Connector 12">
-            <a:extLst>
-              <a:ext uri="{FF2B5EF4-FFF2-40B4-BE49-F238E27FC236}">
-                <a16:creationId xmlns:a16="http://schemas.microsoft.com/office/drawing/2014/main" id="{679C674D-F8EA-87D2-3523-1631941EBAFA}"/>
-              </a:ext>
-            </a:extLst>
-          </p:cNvPr>
-          <p:cNvCxnSpPr/>
-          <p:nvPr/>
-        </p:nvCxnSpPr>
-        <p:spPr>
-          <a:xfrm>
-            <a:off x="7668344" y="2132856"/>
-            <a:ext cx="0" cy="1368152"/>
-          </a:xfrm>
-          <a:prstGeom prst="straightConnector1">
-            <a:avLst/>
-          </a:prstGeom>
-          <a:ln>
-            <a:tailEnd type="triangle"/>
-          </a:ln>
-        </p:spPr>
-        <p:style>
-          <a:lnRef idx="1">
-            <a:schemeClr val="accent1"/>
-          </a:lnRef>
-          <a:fillRef idx="0">
-            <a:schemeClr val="accent1"/>
-          </a:fillRef>
-          <a:effectRef idx="0">
-            <a:schemeClr val="accent1"/>
-          </a:effectRef>
-          <a:fontRef idx="minor">
-            <a:schemeClr val="tx1"/>
-          </a:fontRef>
-        </p:style>
-      </p:cxnSp>
-      <p:cxnSp>
-        <p:nvCxnSpPr>
-          <p:cNvPr id="15" name="Straight Arrow Connector 14">
-            <a:extLst>
-              <a:ext uri="{FF2B5EF4-FFF2-40B4-BE49-F238E27FC236}">
-                <a16:creationId xmlns:a16="http://schemas.microsoft.com/office/drawing/2014/main" id="{A5BA3D3E-EBFF-46B2-8A68-BD08ADD82972}"/>
-              </a:ext>
-            </a:extLst>
-          </p:cNvPr>
-          <p:cNvCxnSpPr/>
-          <p:nvPr/>
-        </p:nvCxnSpPr>
-        <p:spPr>
-          <a:xfrm>
-            <a:off x="3923928" y="2492896"/>
-            <a:ext cx="0" cy="1368152"/>
-          </a:xfrm>
-          <a:prstGeom prst="straightConnector1">
-            <a:avLst/>
-          </a:prstGeom>
-          <a:ln>
-            <a:tailEnd type="triangle"/>
-          </a:ln>
-        </p:spPr>
-        <p:style>
-          <a:lnRef idx="1">
-            <a:schemeClr val="accent1"/>
-          </a:lnRef>
-          <a:fillRef idx="0">
-            <a:schemeClr val="accent1"/>
-          </a:fillRef>
-          <a:effectRef idx="0">
-            <a:schemeClr val="accent1"/>
-          </a:effectRef>
-          <a:fontRef idx="minor">
-            <a:schemeClr val="tx1"/>
-          </a:fontRef>
-        </p:style>
-      </p:cxnSp>
-      <p:sp>
-        <p:nvSpPr>
-          <p:cNvPr id="24" name="TextBox 23">
-            <a:extLst>
-              <a:ext uri="{FF2B5EF4-FFF2-40B4-BE49-F238E27FC236}">
-                <a16:creationId xmlns:a16="http://schemas.microsoft.com/office/drawing/2014/main" id="{A94C6F25-3CDE-2DF8-9CC1-882148FD9055}"/>
+                <a16:creationId xmlns:a16="http://schemas.microsoft.com/office/drawing/2014/main" id="{CD61FC60-C143-BE04-997F-CC72BF865E3A}"/>
               </a:ext>
             </a:extLst>
           </p:cNvPr>
@@ -4321,8 +4920,8 @@
         </p:nvSpPr>
         <p:spPr>
           <a:xfrm>
-            <a:off x="2627784" y="4005064"/>
-            <a:ext cx="2592287" cy="369332"/>
+            <a:off x="683568" y="952802"/>
+            <a:ext cx="7776864" cy="5444054"/>
           </a:xfrm>
           <a:prstGeom prst="rect">
             <a:avLst/>
@@ -4335,49 +4934,278 @@
           </a:bodyPr>
           <a:lstStyle/>
           <a:p>
-            <a:r>
-              <a:rPr lang="en-US" dirty="0"/>
-              <a:t>Login /Register (ref tag)</a:t>
-            </a:r>
-          </a:p>
-        </p:txBody>
-      </p:sp>
-      <p:sp>
-        <p:nvSpPr>
-          <p:cNvPr id="25" name="TextBox 24">
-            <a:extLst>
-              <a:ext uri="{FF2B5EF4-FFF2-40B4-BE49-F238E27FC236}">
-                <a16:creationId xmlns:a16="http://schemas.microsoft.com/office/drawing/2014/main" id="{C45A03C7-E255-3617-5BDC-2CB89E85F4EC}"/>
-              </a:ext>
-            </a:extLst>
-          </p:cNvPr>
-          <p:cNvSpPr txBox="1"/>
-          <p:nvPr/>
-        </p:nvSpPr>
-        <p:spPr>
-          <a:xfrm>
-            <a:off x="6588224" y="3820398"/>
-            <a:ext cx="2448266" cy="369332"/>
-          </a:xfrm>
-          <a:prstGeom prst="rect">
-            <a:avLst/>
-          </a:prstGeom>
-          <a:noFill/>
-        </p:spPr>
-        <p:txBody>
-          <a:bodyPr wrap="square" rtlCol="0">
-            <a:spAutoFit/>
-          </a:bodyPr>
-          <a:lstStyle/>
-          <a:p>
-            <a:r>
-              <a:rPr lang="en-US" dirty="0"/>
-              <a:t>Sign In/Sign Up (button)</a:t>
+            <a:pPr algn="just">
+              <a:lnSpc>
+                <a:spcPct val="150000"/>
+              </a:lnSpc>
+            </a:pPr>
+            <a:r>
+              <a:rPr lang="en-US" dirty="0">
+                <a:latin typeface="Times New Roman" panose="02020603050405020304" pitchFamily="18" charset="0"/>
+                <a:cs typeface="Times New Roman" panose="02020603050405020304" pitchFamily="18" charset="0"/>
+              </a:rPr>
+              <a:t>The project uses a variety of </a:t>
+            </a:r>
+            <a:r>
+              <a:rPr lang="en-US" dirty="0" err="1">
+                <a:latin typeface="Times New Roman" panose="02020603050405020304" pitchFamily="18" charset="0"/>
+                <a:cs typeface="Times New Roman" panose="02020603050405020304" pitchFamily="18" charset="0"/>
+              </a:rPr>
+              <a:t>componenets</a:t>
+            </a:r>
+            <a:r>
+              <a:rPr lang="en-US" dirty="0">
+                <a:latin typeface="Times New Roman" panose="02020603050405020304" pitchFamily="18" charset="0"/>
+                <a:cs typeface="Times New Roman" panose="02020603050405020304" pitchFamily="18" charset="0"/>
+              </a:rPr>
+              <a:t> to achieve the following :</a:t>
+            </a:r>
+            <a:br>
+              <a:rPr lang="en-US" dirty="0">
+                <a:latin typeface="Times New Roman" panose="02020603050405020304" pitchFamily="18" charset="0"/>
+                <a:cs typeface="Times New Roman" panose="02020603050405020304" pitchFamily="18" charset="0"/>
+              </a:rPr>
+            </a:br>
+            <a:r>
+              <a:rPr lang="en-US" dirty="0">
+                <a:latin typeface="Times New Roman" panose="02020603050405020304" pitchFamily="18" charset="0"/>
+                <a:cs typeface="Times New Roman" panose="02020603050405020304" pitchFamily="18" charset="0"/>
+              </a:rPr>
+              <a:t>1.)</a:t>
+            </a:r>
+            <a:r>
+              <a:rPr lang="en-US" b="1" u="sng" dirty="0">
+                <a:latin typeface="Times New Roman" panose="02020603050405020304" pitchFamily="18" charset="0"/>
+                <a:cs typeface="Times New Roman" panose="02020603050405020304" pitchFamily="18" charset="0"/>
+              </a:rPr>
+              <a:t>User Management</a:t>
+            </a:r>
+            <a:r>
+              <a:rPr lang="en-US" b="1" dirty="0">
+                <a:latin typeface="Times New Roman" panose="02020603050405020304" pitchFamily="18" charset="0"/>
+                <a:cs typeface="Times New Roman" panose="02020603050405020304" pitchFamily="18" charset="0"/>
+              </a:rPr>
+              <a:t>:</a:t>
+            </a:r>
+            <a:endParaRPr lang="en-US" dirty="0">
+              <a:latin typeface="Times New Roman" panose="02020603050405020304" pitchFamily="18" charset="0"/>
+              <a:cs typeface="Times New Roman" panose="02020603050405020304" pitchFamily="18" charset="0"/>
+            </a:endParaRPr>
+          </a:p>
+          <a:p>
+            <a:pPr algn="just">
+              <a:lnSpc>
+                <a:spcPct val="150000"/>
+              </a:lnSpc>
+              <a:buFont typeface="Arial" panose="020B0604020202020204" pitchFamily="34" charset="0"/>
+              <a:buChar char="•"/>
+            </a:pPr>
+            <a:r>
+              <a:rPr lang="en-US" b="1" dirty="0">
+                <a:latin typeface="Times New Roman" panose="02020603050405020304" pitchFamily="18" charset="0"/>
+                <a:cs typeface="Times New Roman" panose="02020603050405020304" pitchFamily="18" charset="0"/>
+              </a:rPr>
+              <a:t>Registration and Login:</a:t>
+            </a:r>
+            <a:r>
+              <a:rPr lang="en-US" dirty="0">
+                <a:latin typeface="Times New Roman" panose="02020603050405020304" pitchFamily="18" charset="0"/>
+                <a:cs typeface="Times New Roman" panose="02020603050405020304" pitchFamily="18" charset="0"/>
+              </a:rPr>
+              <a:t> Allow users to create accounts and log in securely using email and username.</a:t>
+            </a:r>
+          </a:p>
+          <a:p>
+            <a:pPr algn="just">
+              <a:lnSpc>
+                <a:spcPct val="150000"/>
+              </a:lnSpc>
+            </a:pPr>
+            <a:r>
+              <a:rPr lang="en-US" dirty="0">
+                <a:latin typeface="Times New Roman" panose="02020603050405020304" pitchFamily="18" charset="0"/>
+                <a:cs typeface="Times New Roman" panose="02020603050405020304" pitchFamily="18" charset="0"/>
+              </a:rPr>
+              <a:t>2.)</a:t>
+            </a:r>
+            <a:r>
+              <a:rPr lang="en-US" b="1" u="sng" dirty="0">
+                <a:latin typeface="Times New Roman" panose="02020603050405020304" pitchFamily="18" charset="0"/>
+                <a:cs typeface="Times New Roman" panose="02020603050405020304" pitchFamily="18" charset="0"/>
+              </a:rPr>
+              <a:t>Content Sharing </a:t>
+            </a:r>
+            <a:r>
+              <a:rPr lang="en-US" b="1" dirty="0">
+                <a:latin typeface="Times New Roman" panose="02020603050405020304" pitchFamily="18" charset="0"/>
+                <a:cs typeface="Times New Roman" panose="02020603050405020304" pitchFamily="18" charset="0"/>
+              </a:rPr>
+              <a:t>:</a:t>
+            </a:r>
+            <a:endParaRPr lang="en-US" dirty="0">
+              <a:latin typeface="Times New Roman" panose="02020603050405020304" pitchFamily="18" charset="0"/>
+              <a:cs typeface="Times New Roman" panose="02020603050405020304" pitchFamily="18" charset="0"/>
+            </a:endParaRPr>
+          </a:p>
+          <a:p>
+            <a:pPr algn="just">
+              <a:lnSpc>
+                <a:spcPct val="150000"/>
+              </a:lnSpc>
+              <a:buFont typeface="Arial" panose="020B0604020202020204" pitchFamily="34" charset="0"/>
+              <a:buChar char="•"/>
+            </a:pPr>
+            <a:r>
+              <a:rPr lang="en-US" b="1" dirty="0">
+                <a:latin typeface="Times New Roman" panose="02020603050405020304" pitchFamily="18" charset="0"/>
+                <a:cs typeface="Times New Roman" panose="02020603050405020304" pitchFamily="18" charset="0"/>
+              </a:rPr>
+              <a:t>Photo and Video Uploads:</a:t>
+            </a:r>
+            <a:r>
+              <a:rPr lang="en-US" dirty="0">
+                <a:latin typeface="Times New Roman" panose="02020603050405020304" pitchFamily="18" charset="0"/>
+                <a:cs typeface="Times New Roman" panose="02020603050405020304" pitchFamily="18" charset="0"/>
+              </a:rPr>
+              <a:t> Enable users to upload photos and videos from their devices and delete the posts/comments .</a:t>
+            </a:r>
+          </a:p>
+          <a:p>
+            <a:pPr algn="just">
+              <a:lnSpc>
+                <a:spcPct val="150000"/>
+              </a:lnSpc>
+              <a:buFont typeface="Arial" panose="020B0604020202020204" pitchFamily="34" charset="0"/>
+              <a:buChar char="•"/>
+            </a:pPr>
+            <a:r>
+              <a:rPr lang="en-US" b="1" dirty="0">
+                <a:latin typeface="Times New Roman" panose="02020603050405020304" pitchFamily="18" charset="0"/>
+                <a:cs typeface="Times New Roman" panose="02020603050405020304" pitchFamily="18" charset="0"/>
+              </a:rPr>
+              <a:t>Feed:</a:t>
+            </a:r>
+            <a:r>
+              <a:rPr lang="en-US" dirty="0">
+                <a:latin typeface="Times New Roman" panose="02020603050405020304" pitchFamily="18" charset="0"/>
+                <a:cs typeface="Times New Roman" panose="02020603050405020304" pitchFamily="18" charset="0"/>
+              </a:rPr>
+              <a:t> Curate a personalized feed showcasing posts from users .</a:t>
+            </a:r>
+          </a:p>
+          <a:p>
+            <a:pPr algn="just">
+              <a:lnSpc>
+                <a:spcPct val="150000"/>
+              </a:lnSpc>
+            </a:pPr>
+            <a:r>
+              <a:rPr lang="en-US" dirty="0">
+                <a:latin typeface="Times New Roman" panose="02020603050405020304" pitchFamily="18" charset="0"/>
+                <a:cs typeface="Times New Roman" panose="02020603050405020304" pitchFamily="18" charset="0"/>
+              </a:rPr>
+              <a:t>3.)</a:t>
+            </a:r>
+            <a:r>
+              <a:rPr lang="en-US" b="1" u="sng" dirty="0">
+                <a:latin typeface="Times New Roman" panose="02020603050405020304" pitchFamily="18" charset="0"/>
+                <a:cs typeface="Times New Roman" panose="02020603050405020304" pitchFamily="18" charset="0"/>
+              </a:rPr>
+              <a:t>Interaction Features</a:t>
+            </a:r>
+            <a:r>
+              <a:rPr lang="en-US" b="1" dirty="0">
+                <a:latin typeface="Times New Roman" panose="02020603050405020304" pitchFamily="18" charset="0"/>
+                <a:cs typeface="Times New Roman" panose="02020603050405020304" pitchFamily="18" charset="0"/>
+              </a:rPr>
+              <a:t>:</a:t>
+            </a:r>
+            <a:endParaRPr lang="en-US" dirty="0">
+              <a:latin typeface="Times New Roman" panose="02020603050405020304" pitchFamily="18" charset="0"/>
+              <a:cs typeface="Times New Roman" panose="02020603050405020304" pitchFamily="18" charset="0"/>
+            </a:endParaRPr>
+          </a:p>
+          <a:p>
+            <a:pPr algn="just">
+              <a:lnSpc>
+                <a:spcPct val="150000"/>
+              </a:lnSpc>
+              <a:buFont typeface="Arial" panose="020B0604020202020204" pitchFamily="34" charset="0"/>
+              <a:buChar char="•"/>
+            </a:pPr>
+            <a:r>
+              <a:rPr lang="en-US" b="1" dirty="0">
+                <a:latin typeface="Times New Roman" panose="02020603050405020304" pitchFamily="18" charset="0"/>
+                <a:cs typeface="Times New Roman" panose="02020603050405020304" pitchFamily="18" charset="0"/>
+              </a:rPr>
+              <a:t>Comments:</a:t>
+            </a:r>
+            <a:r>
+              <a:rPr lang="en-US" dirty="0">
+                <a:latin typeface="Times New Roman" panose="02020603050405020304" pitchFamily="18" charset="0"/>
+                <a:cs typeface="Times New Roman" panose="02020603050405020304" pitchFamily="18" charset="0"/>
+              </a:rPr>
+              <a:t> Enable users comment on posts to interact with content and creators.</a:t>
+            </a:r>
+          </a:p>
+          <a:p>
+            <a:pPr algn="just">
+              <a:lnSpc>
+                <a:spcPct val="150000"/>
+              </a:lnSpc>
+              <a:buFont typeface="Arial" panose="020B0604020202020204" pitchFamily="34" charset="0"/>
+              <a:buChar char="•"/>
+            </a:pPr>
+            <a:r>
+              <a:rPr lang="en-US" b="1" dirty="0">
+                <a:latin typeface="Times New Roman" panose="02020603050405020304" pitchFamily="18" charset="0"/>
+                <a:cs typeface="Times New Roman" panose="02020603050405020304" pitchFamily="18" charset="0"/>
+              </a:rPr>
+              <a:t>Captions</a:t>
+            </a:r>
+            <a:r>
+              <a:rPr lang="en-US" dirty="0">
+                <a:latin typeface="Times New Roman" panose="02020603050405020304" pitchFamily="18" charset="0"/>
+                <a:cs typeface="Times New Roman" panose="02020603050405020304" pitchFamily="18" charset="0"/>
+              </a:rPr>
+              <a:t>: Enable users to caption their posts.</a:t>
+            </a:r>
+          </a:p>
+          <a:p>
+            <a:pPr marL="285750" indent="-285750" algn="just">
+              <a:lnSpc>
+                <a:spcPct val="150000"/>
+              </a:lnSpc>
+              <a:buFont typeface="Courier New" panose="02070309020205020404" pitchFamily="49" charset="0"/>
+              <a:buChar char="o"/>
+            </a:pPr>
+            <a:endParaRPr lang="en-US" dirty="0">
+              <a:latin typeface="Times New Roman" panose="02020603050405020304" pitchFamily="18" charset="0"/>
+              <a:cs typeface="Times New Roman" panose="02020603050405020304" pitchFamily="18" charset="0"/>
+            </a:endParaRPr>
+          </a:p>
+          <a:p>
+            <a:pPr algn="just">
+              <a:lnSpc>
+                <a:spcPct val="150000"/>
+              </a:lnSpc>
+            </a:pPr>
+            <a:r>
+              <a:rPr lang="en-US" dirty="0">
+                <a:latin typeface="Times New Roman" panose="02020603050405020304" pitchFamily="18" charset="0"/>
+                <a:cs typeface="Times New Roman" panose="02020603050405020304" pitchFamily="18" charset="0"/>
+              </a:rPr>
+              <a:t> </a:t>
             </a:r>
           </a:p>
         </p:txBody>
       </p:sp>
     </p:spTree>
+    <p:extLst>
+      <p:ext uri="{BB962C8B-B14F-4D97-AF65-F5344CB8AC3E}">
+        <p14:creationId xmlns:p14="http://schemas.microsoft.com/office/powerpoint/2010/main" val="1947169785"/>
+      </p:ext>
+    </p:extLst>
   </p:cSld>
   <p:clrMapOvr>
     <a:masterClrMapping/>
@@ -4439,17 +5267,31 @@
                 <a:latin typeface="Times New Roman" pitchFamily="18" charset="0"/>
                 <a:cs typeface="Times New Roman" pitchFamily="18" charset="0"/>
               </a:rPr>
-              <a:t>(file upload)</a:t>
+              <a:t>(Login/</a:t>
+            </a:r>
+            <a:r>
+              <a:rPr lang="en-US" dirty="0" err="1">
+                <a:latin typeface="Times New Roman" pitchFamily="18" charset="0"/>
+                <a:cs typeface="Times New Roman" pitchFamily="18" charset="0"/>
+              </a:rPr>
+              <a:t>SignUp</a:t>
+            </a:r>
+            <a:r>
+              <a:rPr lang="en-US" dirty="0">
+                <a:latin typeface="Times New Roman" pitchFamily="18" charset="0"/>
+                <a:cs typeface="Times New Roman" pitchFamily="18" charset="0"/>
+              </a:rPr>
+              <a:t> Page)</a:t>
             </a:r>
           </a:p>
         </p:txBody>
       </p:sp>
       <p:pic>
         <p:nvPicPr>
-          <p:cNvPr id="4" name="Picture 3">
+          <p:cNvPr id="5" name="Picture 4">
             <a:extLst>
               <a:ext uri="{FF2B5EF4-FFF2-40B4-BE49-F238E27FC236}">
-                <a16:creationId xmlns:a16="http://schemas.microsoft.com/office/drawing/2014/main" id="{37FEE16C-FE33-2437-7BA0-94393D5325D3}"/>
+                <a16:creationId xmlns:a16="http://schemas.microsoft.com/office/drawing/2014/main" id="{182BFCC4-A93B-E6B8-D308-CB199ADC952F}"/>
               </a:ext>
             </a:extLst>
           </p:cNvPr>
@@ -4459,7 +5301,7 @@
           <p:nvPr/>
         </p:nvPicPr>
         <p:blipFill>
-          <a:blip r:embed="rId2">
+          <a:blip r:embed="rId2" cstate="print">
             <a:extLst>
               <a:ext uri="{28A0092B-C50C-407E-A947-70E740481C1C}">
                 <a14:useLocalDpi xmlns:a14="http://schemas.microsoft.com/office/drawing/2010/main" val="0"/>
@@ -4472,102 +5314,30 @@
         </p:blipFill>
         <p:spPr>
           <a:xfrm>
-            <a:off x="440257" y="1628800"/>
-            <a:ext cx="7956376" cy="4274943"/>
+            <a:off x="899592" y="1628800"/>
+            <a:ext cx="7164288" cy="3860278"/>
           </a:xfrm>
           <a:prstGeom prst="rect">
             <a:avLst/>
           </a:prstGeom>
         </p:spPr>
       </p:pic>
-      <p:sp>
-        <p:nvSpPr>
-          <p:cNvPr id="5" name="TextBox 4">
+      <p:cxnSp>
+        <p:nvCxnSpPr>
+          <p:cNvPr id="13" name="Straight Arrow Connector 12">
             <a:extLst>
               <a:ext uri="{FF2B5EF4-FFF2-40B4-BE49-F238E27FC236}">
-                <a16:creationId xmlns:a16="http://schemas.microsoft.com/office/drawing/2014/main" id="{8592D5E6-B6E2-6542-7169-5073CFCAEBDB}"/>
+                <a16:creationId xmlns:a16="http://schemas.microsoft.com/office/drawing/2014/main" id="{679C674D-F8EA-87D2-3523-1631941EBAFA}"/>
               </a:ext>
             </a:extLst>
           </p:cNvPr>
-          <p:cNvSpPr txBox="1"/>
-          <p:nvPr/>
-        </p:nvSpPr>
-        <p:spPr>
-          <a:xfrm>
-            <a:off x="3059832" y="1259468"/>
-            <a:ext cx="2520280" cy="646331"/>
-          </a:xfrm>
-          <a:prstGeom prst="rect">
-            <a:avLst/>
-          </a:prstGeom>
-          <a:noFill/>
-        </p:spPr>
-        <p:txBody>
-          <a:bodyPr wrap="square" rtlCol="0">
-            <a:spAutoFit/>
-          </a:bodyPr>
-          <a:lstStyle/>
-          <a:p>
-            <a:r>
-              <a:rPr lang="en-US" dirty="0"/>
-              <a:t>Browse button to locate the file</a:t>
-            </a:r>
-          </a:p>
-        </p:txBody>
-      </p:sp>
-      <p:sp>
-        <p:nvSpPr>
-          <p:cNvPr id="6" name="TextBox 5">
-            <a:extLst>
-              <a:ext uri="{FF2B5EF4-FFF2-40B4-BE49-F238E27FC236}">
-                <a16:creationId xmlns:a16="http://schemas.microsoft.com/office/drawing/2014/main" id="{19849034-7D55-CA2F-7084-AFF4E8A1411F}"/>
-              </a:ext>
-            </a:extLst>
-          </p:cNvPr>
-          <p:cNvSpPr txBox="1"/>
-          <p:nvPr/>
-        </p:nvSpPr>
-        <p:spPr>
-          <a:xfrm>
-            <a:off x="3491880" y="4859868"/>
-            <a:ext cx="2160240" cy="369332"/>
-          </a:xfrm>
-          <a:prstGeom prst="rect">
-            <a:avLst/>
-          </a:prstGeom>
-          <a:noFill/>
-        </p:spPr>
-        <p:txBody>
-          <a:bodyPr wrap="square" rtlCol="0">
-            <a:spAutoFit/>
-          </a:bodyPr>
-          <a:lstStyle/>
-          <a:p>
-            <a:r>
-              <a:rPr lang="en-US" dirty="0"/>
-              <a:t>Button to add post</a:t>
-            </a:r>
-          </a:p>
-        </p:txBody>
-      </p:sp>
-      <p:cxnSp>
-        <p:nvCxnSpPr>
-          <p:cNvPr id="8" name="Straight Arrow Connector 7">
-            <a:extLst>
-              <a:ext uri="{FF2B5EF4-FFF2-40B4-BE49-F238E27FC236}">
-                <a16:creationId xmlns:a16="http://schemas.microsoft.com/office/drawing/2014/main" id="{A1A20C46-04BA-7CE7-02C7-18B18DCD77D5}"/>
-              </a:ext>
-            </a:extLst>
-          </p:cNvPr>
-          <p:cNvCxnSpPr>
-            <a:cxnSpLocks/>
-          </p:cNvCxnSpPr>
+          <p:cNvCxnSpPr/>
           <p:nvPr/>
         </p:nvCxnSpPr>
         <p:spPr>
-          <a:xfrm flipH="1">
-            <a:off x="3419872" y="1628800"/>
-            <a:ext cx="648072" cy="933323"/>
+          <a:xfrm>
+            <a:off x="7668344" y="2132856"/>
+            <a:ext cx="0" cy="1368152"/>
           </a:xfrm>
           <a:prstGeom prst="straightConnector1">
             <a:avLst/>
@@ -4593,22 +5363,20 @@
       </p:cxnSp>
       <p:cxnSp>
         <p:nvCxnSpPr>
-          <p:cNvPr id="13" name="Straight Arrow Connector 12">
+          <p:cNvPr id="15" name="Straight Arrow Connector 14">
             <a:extLst>
               <a:ext uri="{FF2B5EF4-FFF2-40B4-BE49-F238E27FC236}">
-                <a16:creationId xmlns:a16="http://schemas.microsoft.com/office/drawing/2014/main" id="{C87B0922-5486-A9D6-72F7-CDE5038C483B}"/>
+                <a16:creationId xmlns:a16="http://schemas.microsoft.com/office/drawing/2014/main" id="{A5BA3D3E-EBFF-46B2-8A68-BD08ADD82972}"/>
               </a:ext>
             </a:extLst>
           </p:cNvPr>
-          <p:cNvCxnSpPr>
-            <a:cxnSpLocks/>
-          </p:cNvCxnSpPr>
+          <p:cNvCxnSpPr/>
           <p:nvPr/>
         </p:nvCxnSpPr>
         <p:spPr>
           <a:xfrm>
-            <a:off x="4418445" y="3553776"/>
-            <a:ext cx="0" cy="1325012"/>
+            <a:off x="3923928" y="2492896"/>
+            <a:ext cx="0" cy="1368152"/>
           </a:xfrm>
           <a:prstGeom prst="straightConnector1">
             <a:avLst/>
@@ -4632,12 +5400,77 @@
           </a:fontRef>
         </p:style>
       </p:cxnSp>
+      <p:sp>
+        <p:nvSpPr>
+          <p:cNvPr id="24" name="TextBox 23">
+            <a:extLst>
+              <a:ext uri="{FF2B5EF4-FFF2-40B4-BE49-F238E27FC236}">
+                <a16:creationId xmlns:a16="http://schemas.microsoft.com/office/drawing/2014/main" id="{A94C6F25-3CDE-2DF8-9CC1-882148FD9055}"/>
+              </a:ext>
+            </a:extLst>
+          </p:cNvPr>
+          <p:cNvSpPr txBox="1"/>
+          <p:nvPr/>
+        </p:nvSpPr>
+        <p:spPr>
+          <a:xfrm>
+            <a:off x="2627784" y="4005064"/>
+            <a:ext cx="2592287" cy="369332"/>
+          </a:xfrm>
+          <a:prstGeom prst="rect">
+            <a:avLst/>
+          </a:prstGeom>
+          <a:noFill/>
+        </p:spPr>
+        <p:txBody>
+          <a:bodyPr wrap="square" rtlCol="0">
+            <a:spAutoFit/>
+          </a:bodyPr>
+          <a:lstStyle/>
+          <a:p>
+            <a:r>
+              <a:rPr lang="en-US" dirty="0"/>
+              <a:t>Login /Register (ref tag)</a:t>
+            </a:r>
+          </a:p>
+        </p:txBody>
+      </p:sp>
+      <p:sp>
+        <p:nvSpPr>
+          <p:cNvPr id="25" name="TextBox 24">
+            <a:extLst>
+              <a:ext uri="{FF2B5EF4-FFF2-40B4-BE49-F238E27FC236}">
+                <a16:creationId xmlns:a16="http://schemas.microsoft.com/office/drawing/2014/main" id="{C45A03C7-E255-3617-5BDC-2CB89E85F4EC}"/>
+              </a:ext>
+            </a:extLst>
+          </p:cNvPr>
+          <p:cNvSpPr txBox="1"/>
+          <p:nvPr/>
+        </p:nvSpPr>
+        <p:spPr>
+          <a:xfrm>
+            <a:off x="6588224" y="3820398"/>
+            <a:ext cx="2448266" cy="369332"/>
+          </a:xfrm>
+          <a:prstGeom prst="rect">
+            <a:avLst/>
+          </a:prstGeom>
+          <a:noFill/>
+        </p:spPr>
+        <p:txBody>
+          <a:bodyPr wrap="square" rtlCol="0">
+            <a:spAutoFit/>
+          </a:bodyPr>
+          <a:lstStyle/>
+          <a:p>
+            <a:r>
+              <a:rPr lang="en-US" dirty="0"/>
+              <a:t>Sign In/Sign Up (button)</a:t>
+            </a:r>
+          </a:p>
+        </p:txBody>
+      </p:sp>
     </p:spTree>
-    <p:extLst>
-      <p:ext uri="{BB962C8B-B14F-4D97-AF65-F5344CB8AC3E}">
-        <p14:creationId xmlns:p14="http://schemas.microsoft.com/office/powerpoint/2010/main" val="2680909965"/>
-      </p:ext>
-    </p:extLst>
   </p:cSld>
   <p:clrMapOvr>
     <a:masterClrMapping/>
@@ -4665,6 +5498,36 @@
           <a:chExt cx="0" cy="0"/>
         </a:xfrm>
       </p:grpSpPr>
+      <p:pic>
+        <p:nvPicPr>
+          <p:cNvPr id="7" name="Picture 6">
+            <a:extLst>
+              <a:ext uri="{FF2B5EF4-FFF2-40B4-BE49-F238E27FC236}">
+                <a16:creationId xmlns:a16="http://schemas.microsoft.com/office/drawing/2014/main" id="{3544F4C4-051D-FEAC-FC0C-178CFEFC503A}"/>
+              </a:ext>
+            </a:extLst>
+          </p:cNvPr>
+          <p:cNvPicPr>
+            <a:picLocks noChangeAspect="1"/>
+          </p:cNvPicPr>
+          <p:nvPr/>
+        </p:nvPicPr>
+        <p:blipFill>
+          <a:blip r:embed="rId2"/>
+          <a:stretch>
+            <a:fillRect/>
+          </a:stretch>
+        </p:blipFill>
+        <p:spPr>
+          <a:xfrm>
+            <a:off x="629816" y="1553526"/>
+            <a:ext cx="7884368" cy="4000500"/>
+          </a:xfrm>
+          <a:prstGeom prst="rect">
+            <a:avLst/>
+          </a:prstGeom>
+        </p:spPr>
+      </p:pic>
       <p:sp>
         <p:nvSpPr>
           <p:cNvPr id="2" name="TextBox 1"/>
@@ -4699,92 +5562,52 @@
                 <a:latin typeface="Times New Roman" pitchFamily="18" charset="0"/>
                 <a:cs typeface="Times New Roman" pitchFamily="18" charset="0"/>
               </a:rPr>
-              <a:t>(Final Render)</a:t>
+              <a:t>(user credential storage)</a:t>
             </a:r>
           </a:p>
         </p:txBody>
       </p:sp>
-      <p:pic>
-        <p:nvPicPr>
-          <p:cNvPr id="4" name="Picture 3">
+      <p:sp>
+        <p:nvSpPr>
+          <p:cNvPr id="6" name="TextBox 5">
             <a:extLst>
               <a:ext uri="{FF2B5EF4-FFF2-40B4-BE49-F238E27FC236}">
-                <a16:creationId xmlns:a16="http://schemas.microsoft.com/office/drawing/2014/main" id="{A8C4D2A6-56C4-D2B1-96DF-B134B1148303}"/>
+                <a16:creationId xmlns:a16="http://schemas.microsoft.com/office/drawing/2014/main" id="{19849034-7D55-CA2F-7084-AFF4E8A1411F}"/>
               </a:ext>
             </a:extLst>
           </p:cNvPr>
-          <p:cNvPicPr>
-            <a:picLocks noChangeAspect="1"/>
-          </p:cNvPicPr>
+          <p:cNvSpPr txBox="1"/>
           <p:nvPr/>
-        </p:nvPicPr>
-        <p:blipFill>
-          <a:blip r:embed="rId2" cstate="print">
-            <a:extLst>
-              <a:ext uri="{28A0092B-C50C-407E-A947-70E740481C1C}">
-                <a14:useLocalDpi xmlns:a14="http://schemas.microsoft.com/office/drawing/2010/main" val="0"/>
-              </a:ext>
-            </a:extLst>
-          </a:blip>
-          <a:stretch>
-            <a:fillRect/>
-          </a:stretch>
-        </p:blipFill>
+        </p:nvSpPr>
         <p:spPr>
           <a:xfrm>
-            <a:off x="899592" y="1502594"/>
-            <a:ext cx="7164288" cy="3852811"/>
+            <a:off x="3491880" y="4859868"/>
+            <a:ext cx="2160240" cy="369332"/>
           </a:xfrm>
           <a:prstGeom prst="rect">
             <a:avLst/>
           </a:prstGeom>
-        </p:spPr>
-      </p:pic>
+          <a:noFill/>
+        </p:spPr>
+        <p:txBody>
+          <a:bodyPr wrap="square" rtlCol="0">
+            <a:spAutoFit/>
+          </a:bodyPr>
+          <a:lstStyle/>
+          <a:p>
+            <a:r>
+              <a:rPr lang="en-US" dirty="0"/>
+              <a:t>Button to add post</a:t>
+            </a:r>
+          </a:p>
+        </p:txBody>
+      </p:sp>
       <p:cxnSp>
         <p:nvCxnSpPr>
-          <p:cNvPr id="6" name="Straight Arrow Connector 5">
+          <p:cNvPr id="8" name="Straight Arrow Connector 7">
             <a:extLst>
               <a:ext uri="{FF2B5EF4-FFF2-40B4-BE49-F238E27FC236}">
-                <a16:creationId xmlns:a16="http://schemas.microsoft.com/office/drawing/2014/main" id="{3DF15C31-9AB6-D98C-3FAB-79949FF1F8A1}"/>
-              </a:ext>
-            </a:extLst>
-          </p:cNvPr>
-          <p:cNvCxnSpPr/>
-          <p:nvPr/>
-        </p:nvCxnSpPr>
-        <p:spPr>
-          <a:xfrm flipV="1">
-            <a:off x="2483768" y="4797152"/>
-            <a:ext cx="1080120" cy="936104"/>
-          </a:xfrm>
-          <a:prstGeom prst="straightConnector1">
-            <a:avLst/>
-          </a:prstGeom>
-          <a:ln>
-            <a:tailEnd type="triangle"/>
-          </a:ln>
-        </p:spPr>
-        <p:style>
-          <a:lnRef idx="1">
-            <a:schemeClr val="accent1"/>
-          </a:lnRef>
-          <a:fillRef idx="0">
-            <a:schemeClr val="accent1"/>
-          </a:fillRef>
-          <a:effectRef idx="0">
-            <a:schemeClr val="accent1"/>
-          </a:effectRef>
-          <a:fontRef idx="minor">
-            <a:schemeClr val="tx1"/>
-          </a:fontRef>
-        </p:style>
-      </p:cxnSp>
-      <p:cxnSp>
-        <p:nvCxnSpPr>
-          <p:cNvPr id="7" name="Straight Arrow Connector 6">
-            <a:extLst>
-              <a:ext uri="{FF2B5EF4-FFF2-40B4-BE49-F238E27FC236}">
-                <a16:creationId xmlns:a16="http://schemas.microsoft.com/office/drawing/2014/main" id="{1EBCC166-674F-DC76-BA0E-38CB544BBDCA}"/>
+                <a16:creationId xmlns:a16="http://schemas.microsoft.com/office/drawing/2014/main" id="{A1A20C46-04BA-7CE7-02C7-18B18DCD77D5}"/>
               </a:ext>
             </a:extLst>
           </p:cNvPr>
@@ -4794,9 +5617,9 @@
           <p:nvPr/>
         </p:nvCxnSpPr>
         <p:spPr>
-          <a:xfrm flipH="1">
-            <a:off x="5580112" y="4437112"/>
-            <a:ext cx="1346328" cy="0"/>
+          <a:xfrm flipH="1" flipV="1">
+            <a:off x="1734095" y="4005064"/>
+            <a:ext cx="749673" cy="1944216"/>
           </a:xfrm>
           <a:prstGeom prst="straightConnector1">
             <a:avLst/>
@@ -4822,10 +5645,10 @@
       </p:cxnSp>
       <p:sp>
         <p:nvSpPr>
-          <p:cNvPr id="10" name="TextBox 9">
+          <p:cNvPr id="11" name="TextBox 10">
             <a:extLst>
               <a:ext uri="{FF2B5EF4-FFF2-40B4-BE49-F238E27FC236}">
-                <a16:creationId xmlns:a16="http://schemas.microsoft.com/office/drawing/2014/main" id="{606B1E61-D7E8-4EE4-2B21-31D00374C141}"/>
+                <a16:creationId xmlns:a16="http://schemas.microsoft.com/office/drawing/2014/main" id="{E7774717-BA6D-E12E-D601-EBD0FD333B7B}"/>
               </a:ext>
             </a:extLst>
           </p:cNvPr>
@@ -4834,8 +5657,8 @@
         </p:nvSpPr>
         <p:spPr>
           <a:xfrm>
-            <a:off x="7164288" y="4251997"/>
-            <a:ext cx="1512168" cy="369332"/>
+            <a:off x="683568" y="5891506"/>
+            <a:ext cx="4608512" cy="369332"/>
           </a:xfrm>
           <a:prstGeom prst="rect">
             <a:avLst/>
@@ -4850,42 +5673,7 @@
           <a:p>
             <a:r>
               <a:rPr lang="en-US" dirty="0"/>
-              <a:t>Caption</a:t>
-            </a:r>
-          </a:p>
-        </p:txBody>
-      </p:sp>
-      <p:sp>
-        <p:nvSpPr>
-          <p:cNvPr id="11" name="TextBox 10">
-            <a:extLst>
-              <a:ext uri="{FF2B5EF4-FFF2-40B4-BE49-F238E27FC236}">
-                <a16:creationId xmlns:a16="http://schemas.microsoft.com/office/drawing/2014/main" id="{573A2A60-AA54-C19C-65CC-BF888CBE2741}"/>
-              </a:ext>
-            </a:extLst>
-          </p:cNvPr>
-          <p:cNvSpPr txBox="1"/>
-          <p:nvPr/>
-        </p:nvSpPr>
-        <p:spPr>
-          <a:xfrm>
-            <a:off x="1727684" y="5765461"/>
-            <a:ext cx="1512168" cy="369332"/>
-          </a:xfrm>
-          <a:prstGeom prst="rect">
-            <a:avLst/>
-          </a:prstGeom>
-          <a:noFill/>
-        </p:spPr>
-        <p:txBody>
-          <a:bodyPr wrap="square" rtlCol="0">
-            <a:spAutoFit/>
-          </a:bodyPr>
-          <a:lstStyle/>
-          <a:p>
-            <a:r>
-              <a:rPr lang="en-US" dirty="0"/>
-              <a:t>Comments</a:t>
+              <a:t>User email stored at the time of registration</a:t>
             </a:r>
           </a:p>
         </p:txBody>
@@ -4893,7 +5681,7 @@
     </p:spTree>
     <p:extLst>
       <p:ext uri="{BB962C8B-B14F-4D97-AF65-F5344CB8AC3E}">
-        <p14:creationId xmlns:p14="http://schemas.microsoft.com/office/powerpoint/2010/main" val="3720291796"/>
+        <p14:creationId xmlns:p14="http://schemas.microsoft.com/office/powerpoint/2010/main" val="3334810400"/>
       </p:ext>
     </p:extLst>
   </p:cSld>

</xml_diff>